<commit_message>
why should i care
</commit_message>
<xml_diff>
--- a/Blockchain 101.pptx
+++ b/Blockchain 101.pptx
@@ -5,11 +5,12 @@
     <p:sldMasterId id="2147483648" r:id="rId1"/>
   </p:sldMasterIdLst>
   <p:notesMasterIdLst>
-    <p:notesMasterId r:id="rId4"/>
+    <p:notesMasterId r:id="rId5"/>
   </p:notesMasterIdLst>
   <p:sldIdLst>
     <p:sldId id="256" r:id="rId2"/>
     <p:sldId id="258" r:id="rId3"/>
+    <p:sldId id="259" r:id="rId4"/>
   </p:sldIdLst>
   <p:sldSz cx="9144000" cy="5143500" type="screen16x9"/>
   <p:notesSz cx="6858000" cy="9144000"/>
@@ -4010,7 +4011,10 @@
           <a:lstStyle/>
           <a:p>
             <a:r>
-              <a:rPr lang="en-US" dirty="0"/>
+              <a:rPr lang="en-US" dirty="0">
+                <a:latin typeface="Times New Roman" panose="02020603050405020304" pitchFamily="18" charset="0"/>
+                <a:cs typeface="Times New Roman" panose="02020603050405020304" pitchFamily="18" charset="0"/>
+              </a:rPr>
               <a:t>Blockchain 101</a:t>
             </a:r>
           </a:p>
@@ -4198,6 +4202,8 @@
                 <a:solidFill>
                   <a:srgbClr val="55ADEE"/>
                 </a:solidFill>
+                <a:latin typeface="Times New Roman" panose="02020603050405020304" pitchFamily="18" charset="0"/>
+                <a:cs typeface="Times New Roman" panose="02020603050405020304" pitchFamily="18" charset="0"/>
                 <a:hlinkClick r:id="rId5">
                   <a:extLst>
                     <a:ext uri="{A12FA001-AC4F-418D-AE19-62706E023703}">
@@ -4251,6 +4257,8 @@
                 <a:solidFill>
                   <a:srgbClr val="55ADEE"/>
                 </a:solidFill>
+                <a:latin typeface="Times New Roman" panose="02020603050405020304" pitchFamily="18" charset="0"/>
+                <a:cs typeface="Times New Roman" panose="02020603050405020304" pitchFamily="18" charset="0"/>
                 <a:hlinkClick r:id="rId6">
                   <a:extLst>
                     <a:ext uri="{A12FA001-AC4F-418D-AE19-62706E023703}">
@@ -4477,6 +4485,237 @@
     <p:extLst>
       <p:ext uri="{BB962C8B-B14F-4D97-AF65-F5344CB8AC3E}">
         <p14:creationId xmlns:p14="http://schemas.microsoft.com/office/powerpoint/2010/main" val="4170783713"/>
+      </p:ext>
+    </p:extLst>
+  </p:cSld>
+  <p:clrMapOvr>
+    <a:masterClrMapping/>
+  </p:clrMapOvr>
+</p:sld>
+</file>
+
+<file path=ppt/slides/slide3.xml><?xml version="1.0" encoding="utf-8"?>
+<p:sld xmlns:a="http://schemas.openxmlformats.org/drawingml/2006/main" xmlns:r="http://schemas.openxmlformats.org/officeDocument/2006/relationships" xmlns:p="http://schemas.openxmlformats.org/presentationml/2006/main">
+  <p:cSld>
+    <p:spTree>
+      <p:nvGrpSpPr>
+        <p:cNvPr id="1" name=""/>
+        <p:cNvGrpSpPr/>
+        <p:nvPr/>
+      </p:nvGrpSpPr>
+      <p:grpSpPr>
+        <a:xfrm>
+          <a:off x="0" y="0"/>
+          <a:ext cx="0" cy="0"/>
+          <a:chOff x="0" y="0"/>
+          <a:chExt cx="0" cy="0"/>
+        </a:xfrm>
+      </p:grpSpPr>
+      <p:sp>
+        <p:nvSpPr>
+          <p:cNvPr id="4" name="TextBox 3">
+            <a:extLst>
+              <a:ext uri="{FF2B5EF4-FFF2-40B4-BE49-F238E27FC236}">
+                <a16:creationId xmlns:a16="http://schemas.microsoft.com/office/drawing/2014/main" id="{BD4E91A4-843E-42A6-87B6-D24AB2AE4292}"/>
+              </a:ext>
+            </a:extLst>
+          </p:cNvPr>
+          <p:cNvSpPr txBox="1"/>
+          <p:nvPr/>
+        </p:nvSpPr>
+        <p:spPr>
+          <a:xfrm>
+            <a:off x="2586836" y="2156251"/>
+            <a:ext cx="6413610" cy="1384995"/>
+          </a:xfrm>
+          <a:prstGeom prst="rect">
+            <a:avLst/>
+          </a:prstGeom>
+          <a:noFill/>
+        </p:spPr>
+        <p:txBody>
+          <a:bodyPr wrap="square" rtlCol="0">
+            <a:spAutoFit/>
+          </a:bodyPr>
+          <a:lstStyle/>
+          <a:p>
+            <a:r>
+              <a:rPr lang="en-US" sz="2400" dirty="0">
+                <a:latin typeface="Times New Roman" panose="02020603050405020304" pitchFamily="18" charset="0"/>
+                <a:cs typeface="Times New Roman" panose="02020603050405020304" pitchFamily="18" charset="0"/>
+              </a:rPr>
+              <a:t>What the internet did for communications, </a:t>
+            </a:r>
+          </a:p>
+          <a:p>
+            <a:r>
+              <a:rPr lang="en-US" sz="2400" dirty="0">
+                <a:latin typeface="Times New Roman" panose="02020603050405020304" pitchFamily="18" charset="0"/>
+                <a:cs typeface="Times New Roman" panose="02020603050405020304" pitchFamily="18" charset="0"/>
+              </a:rPr>
+              <a:t>I think blockchain will do for trusted transactions.</a:t>
+            </a:r>
+          </a:p>
+          <a:p>
+            <a:endParaRPr lang="en-US" sz="2400" dirty="0">
+              <a:latin typeface="Times New Roman" panose="02020603050405020304" pitchFamily="18" charset="0"/>
+              <a:cs typeface="Times New Roman" panose="02020603050405020304" pitchFamily="18" charset="0"/>
+            </a:endParaRPr>
+          </a:p>
+          <a:p>
+            <a:pPr algn="r"/>
+            <a:r>
+              <a:rPr lang="en-US" sz="1200" dirty="0">
+                <a:latin typeface="Times New Roman" panose="02020603050405020304" pitchFamily="18" charset="0"/>
+                <a:cs typeface="Times New Roman" panose="02020603050405020304" pitchFamily="18" charset="0"/>
+              </a:rPr>
+              <a:t>IBM Chief Executive Ginny Rometty</a:t>
+            </a:r>
+          </a:p>
+        </p:txBody>
+      </p:sp>
+      <p:sp>
+        <p:nvSpPr>
+          <p:cNvPr id="5" name="Title 1">
+            <a:extLst>
+              <a:ext uri="{FF2B5EF4-FFF2-40B4-BE49-F238E27FC236}">
+                <a16:creationId xmlns:a16="http://schemas.microsoft.com/office/drawing/2014/main" id="{0E83F291-A810-43D2-AEC7-44168E787FE6}"/>
+              </a:ext>
+            </a:extLst>
+          </p:cNvPr>
+          <p:cNvSpPr txBox="1">
+            <a:spLocks/>
+          </p:cNvSpPr>
+          <p:nvPr/>
+        </p:nvSpPr>
+        <p:spPr>
+          <a:xfrm>
+            <a:off x="1212491" y="281175"/>
+            <a:ext cx="7787955" cy="500731"/>
+          </a:xfrm>
+          <a:prstGeom prst="rect">
+            <a:avLst/>
+          </a:prstGeom>
+        </p:spPr>
+        <p:txBody>
+          <a:bodyPr vert="horz" lIns="91440" tIns="45720" rIns="91440" bIns="45720" rtlCol="0" anchor="ctr">
+            <a:normAutofit fontScale="85000" lnSpcReduction="20000"/>
+          </a:bodyPr>
+          <a:lstStyle>
+            <a:lvl1pPr algn="l" defTabSz="914400" rtl="0" eaLnBrk="1" latinLnBrk="0" hangingPunct="1">
+              <a:spcBef>
+                <a:spcPct val="0"/>
+              </a:spcBef>
+              <a:buNone/>
+              <a:defRPr sz="3600" kern="1200">
+                <a:solidFill>
+                  <a:srgbClr val="1100EA"/>
+                </a:solidFill>
+                <a:effectLst>
+                  <a:outerShdw blurRad="50800" dist="38100" dir="2700000" algn="tl" rotWithShape="0">
+                    <a:prstClr val="black">
+                      <a:alpha val="40000"/>
+                    </a:prstClr>
+                  </a:outerShdw>
+                </a:effectLst>
+                <a:latin typeface="+mj-lt"/>
+                <a:ea typeface="+mj-ea"/>
+                <a:cs typeface="+mj-cs"/>
+              </a:defRPr>
+            </a:lvl1pPr>
+          </a:lstStyle>
+          <a:p>
+            <a:r>
+              <a:rPr lang="en-US" b="1" dirty="0">
+                <a:effectLst/>
+                <a:latin typeface="Times New Roman" panose="02020603050405020304" pitchFamily="18" charset="0"/>
+                <a:cs typeface="Times New Roman" panose="02020603050405020304" pitchFamily="18" charset="0"/>
+              </a:rPr>
+              <a:t>Why should I care?</a:t>
+            </a:r>
+            <a:endParaRPr lang="en-US" dirty="0">
+              <a:latin typeface="Times New Roman" panose="02020603050405020304" pitchFamily="18" charset="0"/>
+              <a:cs typeface="Times New Roman" panose="02020603050405020304" pitchFamily="18" charset="0"/>
+            </a:endParaRPr>
+          </a:p>
+        </p:txBody>
+      </p:sp>
+      <p:pic>
+        <p:nvPicPr>
+          <p:cNvPr id="7" name="Picture 6">
+            <a:extLst>
+              <a:ext uri="{FF2B5EF4-FFF2-40B4-BE49-F238E27FC236}">
+                <a16:creationId xmlns:a16="http://schemas.microsoft.com/office/drawing/2014/main" id="{55366A53-AFD8-49BC-966D-302DD3D9105B}"/>
+              </a:ext>
+            </a:extLst>
+          </p:cNvPr>
+          <p:cNvPicPr>
+            <a:picLocks noChangeAspect="1"/>
+          </p:cNvPicPr>
+          <p:nvPr/>
+        </p:nvPicPr>
+        <p:blipFill>
+          <a:blip r:embed="rId2" cstate="print">
+            <a:extLst>
+              <a:ext uri="{28A0092B-C50C-407E-A947-70E740481C1C}">
+                <a14:useLocalDpi xmlns:a14="http://schemas.microsoft.com/office/drawing/2010/main" val="0"/>
+              </a:ext>
+            </a:extLst>
+          </a:blip>
+          <a:stretch>
+            <a:fillRect/>
+          </a:stretch>
+        </p:blipFill>
+        <p:spPr>
+          <a:xfrm>
+            <a:off x="2586835" y="3029865"/>
+            <a:ext cx="1498093" cy="1733021"/>
+          </a:xfrm>
+          <a:prstGeom prst="rect">
+            <a:avLst/>
+          </a:prstGeom>
+        </p:spPr>
+      </p:pic>
+      <p:pic>
+        <p:nvPicPr>
+          <p:cNvPr id="9" name="Picture 8">
+            <a:extLst>
+              <a:ext uri="{FF2B5EF4-FFF2-40B4-BE49-F238E27FC236}">
+                <a16:creationId xmlns:a16="http://schemas.microsoft.com/office/drawing/2014/main" id="{3C99C2AA-3B35-4E7C-B14F-F6BFE419FA5C}"/>
+              </a:ext>
+            </a:extLst>
+          </p:cNvPr>
+          <p:cNvPicPr>
+            <a:picLocks noChangeAspect="1"/>
+          </p:cNvPicPr>
+          <p:nvPr/>
+        </p:nvPicPr>
+        <p:blipFill>
+          <a:blip r:embed="rId3">
+            <a:extLst>
+              <a:ext uri="{28A0092B-C50C-407E-A947-70E740481C1C}">
+                <a14:useLocalDpi xmlns:a14="http://schemas.microsoft.com/office/drawing/2010/main" val="0"/>
+              </a:ext>
+            </a:extLst>
+          </a:blip>
+          <a:stretch>
+            <a:fillRect/>
+          </a:stretch>
+        </p:blipFill>
+        <p:spPr>
+          <a:xfrm>
+            <a:off x="4266590" y="4098800"/>
+            <a:ext cx="1438275" cy="571500"/>
+          </a:xfrm>
+          <a:prstGeom prst="rect">
+            <a:avLst/>
+          </a:prstGeom>
+        </p:spPr>
+      </p:pic>
+    </p:spTree>
+    <p:extLst>
+      <p:ext uri="{BB962C8B-B14F-4D97-AF65-F5344CB8AC3E}">
+        <p14:creationId xmlns:p14="http://schemas.microsoft.com/office/powerpoint/2010/main" val="2135896429"/>
       </p:ext>
     </p:extLst>
   </p:cSld>

</xml_diff>

<commit_message>
why should i- update
</commit_message>
<xml_diff>
--- a/Blockchain 101.pptx
+++ b/Blockchain 101.pptx
@@ -4525,8 +4525,8 @@
         </p:nvSpPr>
         <p:spPr>
           <a:xfrm>
-            <a:off x="2586836" y="2156251"/>
-            <a:ext cx="6413610" cy="1384995"/>
+            <a:off x="3808476" y="1802308"/>
+            <a:ext cx="5191969" cy="1538883"/>
           </a:xfrm>
           <a:prstGeom prst="rect">
             <a:avLst/>
@@ -4539,33 +4539,71 @@
           </a:bodyPr>
           <a:lstStyle/>
           <a:p>
-            <a:r>
-              <a:rPr lang="en-US" sz="2400" dirty="0">
+            <a:pPr algn="just"/>
+            <a:r>
+              <a:rPr lang="en-US" dirty="0">
                 <a:latin typeface="Times New Roman" panose="02020603050405020304" pitchFamily="18" charset="0"/>
                 <a:cs typeface="Times New Roman" panose="02020603050405020304" pitchFamily="18" charset="0"/>
               </a:rPr>
-              <a:t>What the internet did for communications, </a:t>
-            </a:r>
-          </a:p>
-          <a:p>
-            <a:r>
-              <a:rPr lang="en-US" sz="2400" dirty="0">
+              <a:t>What the </a:t>
+            </a:r>
+            <a:r>
+              <a:rPr lang="en-US" sz="2000" b="1" dirty="0">
                 <a:latin typeface="Times New Roman" panose="02020603050405020304" pitchFamily="18" charset="0"/>
                 <a:cs typeface="Times New Roman" panose="02020603050405020304" pitchFamily="18" charset="0"/>
               </a:rPr>
-              <a:t>I think blockchain will do for trusted transactions.</a:t>
-            </a:r>
-          </a:p>
-          <a:p>
-            <a:endParaRPr lang="en-US" sz="2400" dirty="0">
+              <a:t>internet</a:t>
+            </a:r>
+            <a:r>
+              <a:rPr lang="en-US" dirty="0">
+                <a:latin typeface="Times New Roman" panose="02020603050405020304" pitchFamily="18" charset="0"/>
+                <a:cs typeface="Times New Roman" panose="02020603050405020304" pitchFamily="18" charset="0"/>
+              </a:rPr>
+              <a:t> did for communications, </a:t>
+            </a:r>
+          </a:p>
+          <a:p>
+            <a:pPr algn="just"/>
+            <a:r>
+              <a:rPr lang="en-US" dirty="0">
+                <a:latin typeface="Times New Roman" panose="02020603050405020304" pitchFamily="18" charset="0"/>
+                <a:cs typeface="Times New Roman" panose="02020603050405020304" pitchFamily="18" charset="0"/>
+              </a:rPr>
+              <a:t>I think </a:t>
+            </a:r>
+            <a:r>
+              <a:rPr lang="en-US" sz="2000" b="1" dirty="0">
+                <a:latin typeface="Times New Roman" panose="02020603050405020304" pitchFamily="18" charset="0"/>
+                <a:cs typeface="Times New Roman" panose="02020603050405020304" pitchFamily="18" charset="0"/>
+              </a:rPr>
+              <a:t>blockchain</a:t>
+            </a:r>
+            <a:r>
+              <a:rPr lang="en-US" dirty="0">
+                <a:latin typeface="Times New Roman" panose="02020603050405020304" pitchFamily="18" charset="0"/>
+                <a:cs typeface="Times New Roman" panose="02020603050405020304" pitchFamily="18" charset="0"/>
+              </a:rPr>
+              <a:t> will do for trusted transactions.</a:t>
+            </a:r>
+          </a:p>
+          <a:p>
+            <a:pPr algn="just"/>
+            <a:endParaRPr lang="en-US" sz="2000" dirty="0">
               <a:latin typeface="Times New Roman" panose="02020603050405020304" pitchFamily="18" charset="0"/>
               <a:cs typeface="Times New Roman" panose="02020603050405020304" pitchFamily="18" charset="0"/>
             </a:endParaRPr>
           </a:p>
           <a:p>
+            <a:pPr algn="just"/>
+            <a:endParaRPr lang="en-US" sz="2000" dirty="0">
+              <a:latin typeface="Times New Roman" panose="02020603050405020304" pitchFamily="18" charset="0"/>
+              <a:cs typeface="Times New Roman" panose="02020603050405020304" pitchFamily="18" charset="0"/>
+            </a:endParaRPr>
+          </a:p>
+          <a:p>
             <a:pPr algn="r"/>
             <a:r>
-              <a:rPr lang="en-US" sz="1200" dirty="0">
+              <a:rPr lang="en-US" sz="1400" dirty="0">
                 <a:latin typeface="Times New Roman" panose="02020603050405020304" pitchFamily="18" charset="0"/>
                 <a:cs typeface="Times New Roman" panose="02020603050405020304" pitchFamily="18" charset="0"/>
               </a:rPr>
@@ -4668,8 +4706,8 @@
         </p:blipFill>
         <p:spPr>
           <a:xfrm>
-            <a:off x="2586835" y="3029865"/>
-            <a:ext cx="1498093" cy="1733021"/>
+            <a:off x="2434130" y="1776817"/>
+            <a:ext cx="1374345" cy="1589866"/>
           </a:xfrm>
           <a:prstGeom prst="rect">
             <a:avLst/>
@@ -4704,7 +4742,7 @@
         </p:blipFill>
         <p:spPr>
           <a:xfrm>
-            <a:off x="4266590" y="4098800"/>
+            <a:off x="7557292" y="4290825"/>
             <a:ext cx="1438275" cy="571500"/>
           </a:xfrm>
           <a:prstGeom prst="rect">

</xml_diff>

<commit_message>
is and is NOT
</commit_message>
<xml_diff>
--- a/Blockchain 101.pptx
+++ b/Blockchain 101.pptx
@@ -5,12 +5,14 @@
     <p:sldMasterId id="2147483648" r:id="rId1"/>
   </p:sldMasterIdLst>
   <p:notesMasterIdLst>
-    <p:notesMasterId r:id="rId5"/>
+    <p:notesMasterId r:id="rId7"/>
   </p:notesMasterIdLst>
   <p:sldIdLst>
     <p:sldId id="256" r:id="rId2"/>
     <p:sldId id="258" r:id="rId3"/>
     <p:sldId id="259" r:id="rId4"/>
+    <p:sldId id="260" r:id="rId5"/>
+    <p:sldId id="261" r:id="rId6"/>
   </p:sldIdLst>
   <p:sldSz cx="9144000" cy="5143500" type="screen16x9"/>
   <p:notesSz cx="6858000" cy="9144000"/>
@@ -126,6 +128,2973 @@
     </p:ext>
   </p:extLst>
 </p:presentation>
+</file>
+
+<file path=ppt/diagrams/colors1.xml><?xml version="1.0" encoding="utf-8"?>
+<dgm:colorsDef xmlns:dgm="http://schemas.openxmlformats.org/drawingml/2006/diagram" xmlns:a="http://schemas.openxmlformats.org/drawingml/2006/main" uniqueId="urn:microsoft.com/office/officeart/2005/8/colors/accent1_2">
+  <dgm:title val=""/>
+  <dgm:desc val=""/>
+  <dgm:catLst>
+    <dgm:cat type="accent1" pri="11200"/>
+  </dgm:catLst>
+  <dgm:styleLbl name="node0">
+    <dgm:fillClrLst meth="repeat">
+      <a:schemeClr val="accent1"/>
+    </dgm:fillClrLst>
+    <dgm:linClrLst meth="repeat">
+      <a:schemeClr val="lt1"/>
+    </dgm:linClrLst>
+    <dgm:effectClrLst/>
+    <dgm:txLinClrLst/>
+    <dgm:txFillClrLst/>
+    <dgm:txEffectClrLst/>
+  </dgm:styleLbl>
+  <dgm:styleLbl name="alignNode1">
+    <dgm:fillClrLst meth="repeat">
+      <a:schemeClr val="accent1"/>
+    </dgm:fillClrLst>
+    <dgm:linClrLst meth="repeat">
+      <a:schemeClr val="accent1"/>
+    </dgm:linClrLst>
+    <dgm:effectClrLst/>
+    <dgm:txLinClrLst/>
+    <dgm:txFillClrLst/>
+    <dgm:txEffectClrLst/>
+  </dgm:styleLbl>
+  <dgm:styleLbl name="node1">
+    <dgm:fillClrLst meth="repeat">
+      <a:schemeClr val="accent1"/>
+    </dgm:fillClrLst>
+    <dgm:linClrLst meth="repeat">
+      <a:schemeClr val="lt1"/>
+    </dgm:linClrLst>
+    <dgm:effectClrLst/>
+    <dgm:txLinClrLst/>
+    <dgm:txFillClrLst/>
+    <dgm:txEffectClrLst/>
+  </dgm:styleLbl>
+  <dgm:styleLbl name="lnNode1">
+    <dgm:fillClrLst meth="repeat">
+      <a:schemeClr val="accent1"/>
+    </dgm:fillClrLst>
+    <dgm:linClrLst meth="repeat">
+      <a:schemeClr val="lt1"/>
+    </dgm:linClrLst>
+    <dgm:effectClrLst/>
+    <dgm:txLinClrLst/>
+    <dgm:txFillClrLst/>
+    <dgm:txEffectClrLst/>
+  </dgm:styleLbl>
+  <dgm:styleLbl name="vennNode1">
+    <dgm:fillClrLst meth="repeat">
+      <a:schemeClr val="accent1">
+        <a:alpha val="50000"/>
+      </a:schemeClr>
+    </dgm:fillClrLst>
+    <dgm:linClrLst meth="repeat">
+      <a:schemeClr val="lt1"/>
+    </dgm:linClrLst>
+    <dgm:effectClrLst/>
+    <dgm:txLinClrLst/>
+    <dgm:txFillClrLst/>
+    <dgm:txEffectClrLst/>
+  </dgm:styleLbl>
+  <dgm:styleLbl name="node2">
+    <dgm:fillClrLst meth="repeat">
+      <a:schemeClr val="accent1"/>
+    </dgm:fillClrLst>
+    <dgm:linClrLst meth="repeat">
+      <a:schemeClr val="lt1"/>
+    </dgm:linClrLst>
+    <dgm:effectClrLst/>
+    <dgm:txLinClrLst/>
+    <dgm:txFillClrLst/>
+    <dgm:txEffectClrLst/>
+  </dgm:styleLbl>
+  <dgm:styleLbl name="node3">
+    <dgm:fillClrLst meth="repeat">
+      <a:schemeClr val="accent1"/>
+    </dgm:fillClrLst>
+    <dgm:linClrLst meth="repeat">
+      <a:schemeClr val="lt1"/>
+    </dgm:linClrLst>
+    <dgm:effectClrLst/>
+    <dgm:txLinClrLst/>
+    <dgm:txFillClrLst/>
+    <dgm:txEffectClrLst/>
+  </dgm:styleLbl>
+  <dgm:styleLbl name="node4">
+    <dgm:fillClrLst meth="repeat">
+      <a:schemeClr val="accent1"/>
+    </dgm:fillClrLst>
+    <dgm:linClrLst meth="repeat">
+      <a:schemeClr val="lt1"/>
+    </dgm:linClrLst>
+    <dgm:effectClrLst/>
+    <dgm:txLinClrLst/>
+    <dgm:txFillClrLst/>
+    <dgm:txEffectClrLst/>
+  </dgm:styleLbl>
+  <dgm:styleLbl name="fgImgPlace1">
+    <dgm:fillClrLst meth="repeat">
+      <a:schemeClr val="accent1">
+        <a:tint val="50000"/>
+      </a:schemeClr>
+    </dgm:fillClrLst>
+    <dgm:linClrLst meth="repeat">
+      <a:schemeClr val="lt1"/>
+    </dgm:linClrLst>
+    <dgm:effectClrLst/>
+    <dgm:txLinClrLst/>
+    <dgm:txFillClrLst meth="repeat">
+      <a:schemeClr val="lt1"/>
+    </dgm:txFillClrLst>
+    <dgm:txEffectClrLst/>
+  </dgm:styleLbl>
+  <dgm:styleLbl name="alignImgPlace1">
+    <dgm:fillClrLst meth="repeat">
+      <a:schemeClr val="accent1">
+        <a:tint val="50000"/>
+      </a:schemeClr>
+    </dgm:fillClrLst>
+    <dgm:linClrLst meth="repeat">
+      <a:schemeClr val="lt1"/>
+    </dgm:linClrLst>
+    <dgm:effectClrLst/>
+    <dgm:txLinClrLst/>
+    <dgm:txFillClrLst meth="repeat">
+      <a:schemeClr val="lt1"/>
+    </dgm:txFillClrLst>
+    <dgm:txEffectClrLst/>
+  </dgm:styleLbl>
+  <dgm:styleLbl name="bgImgPlace1">
+    <dgm:fillClrLst meth="repeat">
+      <a:schemeClr val="accent1">
+        <a:tint val="50000"/>
+      </a:schemeClr>
+    </dgm:fillClrLst>
+    <dgm:linClrLst meth="repeat">
+      <a:schemeClr val="lt1"/>
+    </dgm:linClrLst>
+    <dgm:effectClrLst/>
+    <dgm:txLinClrLst/>
+    <dgm:txFillClrLst meth="repeat">
+      <a:schemeClr val="lt1"/>
+    </dgm:txFillClrLst>
+    <dgm:txEffectClrLst/>
+  </dgm:styleLbl>
+  <dgm:styleLbl name="sibTrans2D1">
+    <dgm:fillClrLst meth="repeat">
+      <a:schemeClr val="accent1">
+        <a:tint val="60000"/>
+      </a:schemeClr>
+    </dgm:fillClrLst>
+    <dgm:linClrLst meth="repeat">
+      <a:schemeClr val="accent1">
+        <a:tint val="60000"/>
+      </a:schemeClr>
+    </dgm:linClrLst>
+    <dgm:effectClrLst/>
+    <dgm:txLinClrLst/>
+    <dgm:txFillClrLst/>
+    <dgm:txEffectClrLst/>
+  </dgm:styleLbl>
+  <dgm:styleLbl name="fgSibTrans2D1">
+    <dgm:fillClrLst meth="repeat">
+      <a:schemeClr val="accent1">
+        <a:tint val="60000"/>
+      </a:schemeClr>
+    </dgm:fillClrLst>
+    <dgm:linClrLst meth="repeat">
+      <a:schemeClr val="accent1">
+        <a:tint val="60000"/>
+      </a:schemeClr>
+    </dgm:linClrLst>
+    <dgm:effectClrLst/>
+    <dgm:txLinClrLst/>
+    <dgm:txFillClrLst/>
+    <dgm:txEffectClrLst/>
+  </dgm:styleLbl>
+  <dgm:styleLbl name="bgSibTrans2D1">
+    <dgm:fillClrLst meth="repeat">
+      <a:schemeClr val="accent1">
+        <a:tint val="60000"/>
+      </a:schemeClr>
+    </dgm:fillClrLst>
+    <dgm:linClrLst meth="repeat">
+      <a:schemeClr val="accent1">
+        <a:tint val="60000"/>
+      </a:schemeClr>
+    </dgm:linClrLst>
+    <dgm:effectClrLst/>
+    <dgm:txLinClrLst/>
+    <dgm:txFillClrLst/>
+    <dgm:txEffectClrLst/>
+  </dgm:styleLbl>
+  <dgm:styleLbl name="sibTrans1D1">
+    <dgm:fillClrLst meth="repeat">
+      <a:schemeClr val="accent1"/>
+    </dgm:fillClrLst>
+    <dgm:linClrLst meth="repeat">
+      <a:schemeClr val="accent1"/>
+    </dgm:linClrLst>
+    <dgm:effectClrLst/>
+    <dgm:txLinClrLst/>
+    <dgm:txFillClrLst meth="repeat">
+      <a:schemeClr val="tx1"/>
+    </dgm:txFillClrLst>
+    <dgm:txEffectClrLst/>
+  </dgm:styleLbl>
+  <dgm:styleLbl name="callout">
+    <dgm:fillClrLst meth="repeat">
+      <a:schemeClr val="accent1"/>
+    </dgm:fillClrLst>
+    <dgm:linClrLst meth="repeat">
+      <a:schemeClr val="accent1">
+        <a:tint val="50000"/>
+      </a:schemeClr>
+    </dgm:linClrLst>
+    <dgm:effectClrLst/>
+    <dgm:txLinClrLst/>
+    <dgm:txFillClrLst meth="repeat">
+      <a:schemeClr val="tx1"/>
+    </dgm:txFillClrLst>
+    <dgm:txEffectClrLst/>
+  </dgm:styleLbl>
+  <dgm:styleLbl name="asst0">
+    <dgm:fillClrLst meth="repeat">
+      <a:schemeClr val="accent1"/>
+    </dgm:fillClrLst>
+    <dgm:linClrLst meth="repeat">
+      <a:schemeClr val="lt1"/>
+    </dgm:linClrLst>
+    <dgm:effectClrLst/>
+    <dgm:txLinClrLst/>
+    <dgm:txFillClrLst/>
+    <dgm:txEffectClrLst/>
+  </dgm:styleLbl>
+  <dgm:styleLbl name="asst1">
+    <dgm:fillClrLst meth="repeat">
+      <a:schemeClr val="accent1"/>
+    </dgm:fillClrLst>
+    <dgm:linClrLst meth="repeat">
+      <a:schemeClr val="lt1"/>
+    </dgm:linClrLst>
+    <dgm:effectClrLst/>
+    <dgm:txLinClrLst/>
+    <dgm:txFillClrLst/>
+    <dgm:txEffectClrLst/>
+  </dgm:styleLbl>
+  <dgm:styleLbl name="asst2">
+    <dgm:fillClrLst meth="repeat">
+      <a:schemeClr val="accent1"/>
+    </dgm:fillClrLst>
+    <dgm:linClrLst meth="repeat">
+      <a:schemeClr val="lt1"/>
+    </dgm:linClrLst>
+    <dgm:effectClrLst/>
+    <dgm:txLinClrLst/>
+    <dgm:txFillClrLst/>
+    <dgm:txEffectClrLst/>
+  </dgm:styleLbl>
+  <dgm:styleLbl name="asst3">
+    <dgm:fillClrLst meth="repeat">
+      <a:schemeClr val="accent1"/>
+    </dgm:fillClrLst>
+    <dgm:linClrLst meth="repeat">
+      <a:schemeClr val="lt1"/>
+    </dgm:linClrLst>
+    <dgm:effectClrLst/>
+    <dgm:txLinClrLst/>
+    <dgm:txFillClrLst/>
+    <dgm:txEffectClrLst/>
+  </dgm:styleLbl>
+  <dgm:styleLbl name="asst4">
+    <dgm:fillClrLst meth="repeat">
+      <a:schemeClr val="accent1"/>
+    </dgm:fillClrLst>
+    <dgm:linClrLst meth="repeat">
+      <a:schemeClr val="lt1"/>
+    </dgm:linClrLst>
+    <dgm:effectClrLst/>
+    <dgm:txLinClrLst/>
+    <dgm:txFillClrLst/>
+    <dgm:txEffectClrLst/>
+  </dgm:styleLbl>
+  <dgm:styleLbl name="parChTrans2D1">
+    <dgm:fillClrLst meth="repeat">
+      <a:schemeClr val="accent1">
+        <a:tint val="60000"/>
+      </a:schemeClr>
+    </dgm:fillClrLst>
+    <dgm:linClrLst meth="repeat">
+      <a:schemeClr val="accent1">
+        <a:tint val="60000"/>
+      </a:schemeClr>
+    </dgm:linClrLst>
+    <dgm:effectClrLst/>
+    <dgm:txLinClrLst/>
+    <dgm:txFillClrLst meth="repeat">
+      <a:schemeClr val="lt1"/>
+    </dgm:txFillClrLst>
+    <dgm:txEffectClrLst/>
+  </dgm:styleLbl>
+  <dgm:styleLbl name="parChTrans2D2">
+    <dgm:fillClrLst meth="repeat">
+      <a:schemeClr val="accent1"/>
+    </dgm:fillClrLst>
+    <dgm:linClrLst meth="repeat">
+      <a:schemeClr val="accent1"/>
+    </dgm:linClrLst>
+    <dgm:effectClrLst/>
+    <dgm:txLinClrLst/>
+    <dgm:txFillClrLst meth="repeat">
+      <a:schemeClr val="lt1"/>
+    </dgm:txFillClrLst>
+    <dgm:txEffectClrLst/>
+  </dgm:styleLbl>
+  <dgm:styleLbl name="parChTrans2D3">
+    <dgm:fillClrLst meth="repeat">
+      <a:schemeClr val="accent1"/>
+    </dgm:fillClrLst>
+    <dgm:linClrLst meth="repeat">
+      <a:schemeClr val="accent1"/>
+    </dgm:linClrLst>
+    <dgm:effectClrLst/>
+    <dgm:txLinClrLst/>
+    <dgm:txFillClrLst meth="repeat">
+      <a:schemeClr val="lt1"/>
+    </dgm:txFillClrLst>
+    <dgm:txEffectClrLst/>
+  </dgm:styleLbl>
+  <dgm:styleLbl name="parChTrans2D4">
+    <dgm:fillClrLst meth="repeat">
+      <a:schemeClr val="accent1"/>
+    </dgm:fillClrLst>
+    <dgm:linClrLst meth="repeat">
+      <a:schemeClr val="accent1"/>
+    </dgm:linClrLst>
+    <dgm:effectClrLst/>
+    <dgm:txLinClrLst/>
+    <dgm:txFillClrLst meth="repeat">
+      <a:schemeClr val="lt1"/>
+    </dgm:txFillClrLst>
+    <dgm:txEffectClrLst/>
+  </dgm:styleLbl>
+  <dgm:styleLbl name="parChTrans1D1">
+    <dgm:fillClrLst meth="repeat">
+      <a:schemeClr val="accent1"/>
+    </dgm:fillClrLst>
+    <dgm:linClrLst meth="repeat">
+      <a:schemeClr val="accent1">
+        <a:shade val="60000"/>
+      </a:schemeClr>
+    </dgm:linClrLst>
+    <dgm:effectClrLst/>
+    <dgm:txLinClrLst/>
+    <dgm:txFillClrLst meth="repeat">
+      <a:schemeClr val="tx1"/>
+    </dgm:txFillClrLst>
+    <dgm:txEffectClrLst/>
+  </dgm:styleLbl>
+  <dgm:styleLbl name="parChTrans1D2">
+    <dgm:fillClrLst meth="repeat">
+      <a:schemeClr val="accent1"/>
+    </dgm:fillClrLst>
+    <dgm:linClrLst meth="repeat">
+      <a:schemeClr val="accent1">
+        <a:shade val="60000"/>
+      </a:schemeClr>
+    </dgm:linClrLst>
+    <dgm:effectClrLst/>
+    <dgm:txLinClrLst/>
+    <dgm:txFillClrLst meth="repeat">
+      <a:schemeClr val="tx1"/>
+    </dgm:txFillClrLst>
+    <dgm:txEffectClrLst/>
+  </dgm:styleLbl>
+  <dgm:styleLbl name="parChTrans1D3">
+    <dgm:fillClrLst meth="repeat">
+      <a:schemeClr val="accent1"/>
+    </dgm:fillClrLst>
+    <dgm:linClrLst meth="repeat">
+      <a:schemeClr val="accent1">
+        <a:shade val="80000"/>
+      </a:schemeClr>
+    </dgm:linClrLst>
+    <dgm:effectClrLst/>
+    <dgm:txLinClrLst/>
+    <dgm:txFillClrLst meth="repeat">
+      <a:schemeClr val="tx1"/>
+    </dgm:txFillClrLst>
+    <dgm:txEffectClrLst/>
+  </dgm:styleLbl>
+  <dgm:styleLbl name="parChTrans1D4">
+    <dgm:fillClrLst meth="repeat">
+      <a:schemeClr val="accent1"/>
+    </dgm:fillClrLst>
+    <dgm:linClrLst meth="repeat">
+      <a:schemeClr val="accent1">
+        <a:shade val="80000"/>
+      </a:schemeClr>
+    </dgm:linClrLst>
+    <dgm:effectClrLst/>
+    <dgm:txLinClrLst/>
+    <dgm:txFillClrLst meth="repeat">
+      <a:schemeClr val="tx1"/>
+    </dgm:txFillClrLst>
+    <dgm:txEffectClrLst/>
+  </dgm:styleLbl>
+  <dgm:styleLbl name="fgAcc1">
+    <dgm:fillClrLst meth="repeat">
+      <a:schemeClr val="lt1">
+        <a:alpha val="90000"/>
+      </a:schemeClr>
+    </dgm:fillClrLst>
+    <dgm:linClrLst meth="repeat">
+      <a:schemeClr val="accent1"/>
+    </dgm:linClrLst>
+    <dgm:effectClrLst/>
+    <dgm:txLinClrLst/>
+    <dgm:txFillClrLst meth="repeat">
+      <a:schemeClr val="dk1"/>
+    </dgm:txFillClrLst>
+    <dgm:txEffectClrLst/>
+  </dgm:styleLbl>
+  <dgm:styleLbl name="conFgAcc1">
+    <dgm:fillClrLst meth="repeat">
+      <a:schemeClr val="lt1">
+        <a:alpha val="90000"/>
+      </a:schemeClr>
+    </dgm:fillClrLst>
+    <dgm:linClrLst meth="repeat">
+      <a:schemeClr val="accent1"/>
+    </dgm:linClrLst>
+    <dgm:effectClrLst/>
+    <dgm:txLinClrLst/>
+    <dgm:txFillClrLst meth="repeat">
+      <a:schemeClr val="dk1"/>
+    </dgm:txFillClrLst>
+    <dgm:txEffectClrLst/>
+  </dgm:styleLbl>
+  <dgm:styleLbl name="alignAcc1">
+    <dgm:fillClrLst meth="repeat">
+      <a:schemeClr val="lt1">
+        <a:alpha val="90000"/>
+      </a:schemeClr>
+    </dgm:fillClrLst>
+    <dgm:linClrLst meth="repeat">
+      <a:schemeClr val="accent1"/>
+    </dgm:linClrLst>
+    <dgm:effectClrLst/>
+    <dgm:txLinClrLst/>
+    <dgm:txFillClrLst meth="repeat">
+      <a:schemeClr val="dk1"/>
+    </dgm:txFillClrLst>
+    <dgm:txEffectClrLst/>
+  </dgm:styleLbl>
+  <dgm:styleLbl name="trAlignAcc1">
+    <dgm:fillClrLst meth="repeat">
+      <a:schemeClr val="lt1">
+        <a:alpha val="40000"/>
+      </a:schemeClr>
+    </dgm:fillClrLst>
+    <dgm:linClrLst meth="repeat">
+      <a:schemeClr val="accent1"/>
+    </dgm:linClrLst>
+    <dgm:effectClrLst/>
+    <dgm:txLinClrLst/>
+    <dgm:txFillClrLst meth="repeat">
+      <a:schemeClr val="dk1"/>
+    </dgm:txFillClrLst>
+    <dgm:txEffectClrLst/>
+  </dgm:styleLbl>
+  <dgm:styleLbl name="bgAcc1">
+    <dgm:fillClrLst meth="repeat">
+      <a:schemeClr val="lt1">
+        <a:alpha val="90000"/>
+      </a:schemeClr>
+    </dgm:fillClrLst>
+    <dgm:linClrLst meth="repeat">
+      <a:schemeClr val="accent1"/>
+    </dgm:linClrLst>
+    <dgm:effectClrLst/>
+    <dgm:txLinClrLst/>
+    <dgm:txFillClrLst meth="repeat">
+      <a:schemeClr val="dk1"/>
+    </dgm:txFillClrLst>
+    <dgm:txEffectClrLst/>
+  </dgm:styleLbl>
+  <dgm:styleLbl name="solidFgAcc1">
+    <dgm:fillClrLst meth="repeat">
+      <a:schemeClr val="lt1"/>
+    </dgm:fillClrLst>
+    <dgm:linClrLst meth="repeat">
+      <a:schemeClr val="accent1"/>
+    </dgm:linClrLst>
+    <dgm:effectClrLst/>
+    <dgm:txLinClrLst/>
+    <dgm:txFillClrLst meth="repeat">
+      <a:schemeClr val="dk1"/>
+    </dgm:txFillClrLst>
+    <dgm:txEffectClrLst/>
+  </dgm:styleLbl>
+  <dgm:styleLbl name="solidAlignAcc1">
+    <dgm:fillClrLst meth="repeat">
+      <a:schemeClr val="lt1"/>
+    </dgm:fillClrLst>
+    <dgm:linClrLst meth="repeat">
+      <a:schemeClr val="accent1"/>
+    </dgm:linClrLst>
+    <dgm:effectClrLst/>
+    <dgm:txLinClrLst/>
+    <dgm:txFillClrLst meth="repeat">
+      <a:schemeClr val="dk1"/>
+    </dgm:txFillClrLst>
+    <dgm:txEffectClrLst/>
+  </dgm:styleLbl>
+  <dgm:styleLbl name="solidBgAcc1">
+    <dgm:fillClrLst meth="repeat">
+      <a:schemeClr val="lt1"/>
+    </dgm:fillClrLst>
+    <dgm:linClrLst meth="repeat">
+      <a:schemeClr val="accent1"/>
+    </dgm:linClrLst>
+    <dgm:effectClrLst/>
+    <dgm:txLinClrLst/>
+    <dgm:txFillClrLst meth="repeat">
+      <a:schemeClr val="dk1"/>
+    </dgm:txFillClrLst>
+    <dgm:txEffectClrLst/>
+  </dgm:styleLbl>
+  <dgm:styleLbl name="fgAccFollowNode1">
+    <dgm:fillClrLst meth="repeat">
+      <a:schemeClr val="accent1">
+        <a:alpha val="90000"/>
+        <a:tint val="40000"/>
+      </a:schemeClr>
+    </dgm:fillClrLst>
+    <dgm:linClrLst meth="repeat">
+      <a:schemeClr val="accent1">
+        <a:alpha val="90000"/>
+        <a:tint val="40000"/>
+      </a:schemeClr>
+    </dgm:linClrLst>
+    <dgm:effectClrLst/>
+    <dgm:txLinClrLst/>
+    <dgm:txFillClrLst meth="repeat">
+      <a:schemeClr val="dk1"/>
+    </dgm:txFillClrLst>
+    <dgm:txEffectClrLst/>
+  </dgm:styleLbl>
+  <dgm:styleLbl name="alignAccFollowNode1">
+    <dgm:fillClrLst meth="repeat">
+      <a:schemeClr val="accent1">
+        <a:alpha val="90000"/>
+        <a:tint val="40000"/>
+      </a:schemeClr>
+    </dgm:fillClrLst>
+    <dgm:linClrLst meth="repeat">
+      <a:schemeClr val="accent1">
+        <a:alpha val="90000"/>
+        <a:tint val="40000"/>
+      </a:schemeClr>
+    </dgm:linClrLst>
+    <dgm:effectClrLst/>
+    <dgm:txLinClrLst/>
+    <dgm:txFillClrLst meth="repeat">
+      <a:schemeClr val="dk1"/>
+    </dgm:txFillClrLst>
+    <dgm:txEffectClrLst/>
+  </dgm:styleLbl>
+  <dgm:styleLbl name="bgAccFollowNode1">
+    <dgm:fillClrLst meth="repeat">
+      <a:schemeClr val="accent1">
+        <a:alpha val="90000"/>
+        <a:tint val="40000"/>
+      </a:schemeClr>
+    </dgm:fillClrLst>
+    <dgm:linClrLst meth="repeat">
+      <a:schemeClr val="accent1">
+        <a:alpha val="90000"/>
+        <a:tint val="40000"/>
+      </a:schemeClr>
+    </dgm:linClrLst>
+    <dgm:effectClrLst/>
+    <dgm:txLinClrLst/>
+    <dgm:txFillClrLst meth="repeat">
+      <a:schemeClr val="dk1"/>
+    </dgm:txFillClrLst>
+    <dgm:txEffectClrLst/>
+  </dgm:styleLbl>
+  <dgm:styleLbl name="fgAcc0">
+    <dgm:fillClrLst meth="repeat">
+      <a:schemeClr val="lt1">
+        <a:alpha val="90000"/>
+      </a:schemeClr>
+    </dgm:fillClrLst>
+    <dgm:linClrLst meth="repeat">
+      <a:schemeClr val="accent1"/>
+    </dgm:linClrLst>
+    <dgm:effectClrLst/>
+    <dgm:txLinClrLst/>
+    <dgm:txFillClrLst meth="repeat">
+      <a:schemeClr val="dk1"/>
+    </dgm:txFillClrLst>
+    <dgm:txEffectClrLst/>
+  </dgm:styleLbl>
+  <dgm:styleLbl name="fgAcc2">
+    <dgm:fillClrLst meth="repeat">
+      <a:schemeClr val="lt1">
+        <a:alpha val="90000"/>
+      </a:schemeClr>
+    </dgm:fillClrLst>
+    <dgm:linClrLst meth="repeat">
+      <a:schemeClr val="accent1"/>
+    </dgm:linClrLst>
+    <dgm:effectClrLst/>
+    <dgm:txLinClrLst/>
+    <dgm:txFillClrLst meth="repeat">
+      <a:schemeClr val="dk1"/>
+    </dgm:txFillClrLst>
+    <dgm:txEffectClrLst/>
+  </dgm:styleLbl>
+  <dgm:styleLbl name="fgAcc3">
+    <dgm:fillClrLst meth="repeat">
+      <a:schemeClr val="lt1">
+        <a:alpha val="90000"/>
+      </a:schemeClr>
+    </dgm:fillClrLst>
+    <dgm:linClrLst meth="repeat">
+      <a:schemeClr val="accent1"/>
+    </dgm:linClrLst>
+    <dgm:effectClrLst/>
+    <dgm:txLinClrLst/>
+    <dgm:txFillClrLst meth="repeat">
+      <a:schemeClr val="dk1"/>
+    </dgm:txFillClrLst>
+    <dgm:txEffectClrLst/>
+  </dgm:styleLbl>
+  <dgm:styleLbl name="fgAcc4">
+    <dgm:fillClrLst meth="repeat">
+      <a:schemeClr val="lt1">
+        <a:alpha val="90000"/>
+      </a:schemeClr>
+    </dgm:fillClrLst>
+    <dgm:linClrLst meth="repeat">
+      <a:schemeClr val="accent1"/>
+    </dgm:linClrLst>
+    <dgm:effectClrLst/>
+    <dgm:txLinClrLst/>
+    <dgm:txFillClrLst meth="repeat">
+      <a:schemeClr val="dk1"/>
+    </dgm:txFillClrLst>
+    <dgm:txEffectClrLst/>
+  </dgm:styleLbl>
+  <dgm:styleLbl name="bgShp">
+    <dgm:fillClrLst meth="repeat">
+      <a:schemeClr val="accent1">
+        <a:tint val="40000"/>
+      </a:schemeClr>
+    </dgm:fillClrLst>
+    <dgm:linClrLst meth="repeat">
+      <a:schemeClr val="accent1"/>
+    </dgm:linClrLst>
+    <dgm:effectClrLst/>
+    <dgm:txLinClrLst/>
+    <dgm:txFillClrLst meth="repeat">
+      <a:schemeClr val="dk1"/>
+    </dgm:txFillClrLst>
+    <dgm:txEffectClrLst/>
+  </dgm:styleLbl>
+  <dgm:styleLbl name="dkBgShp">
+    <dgm:fillClrLst meth="repeat">
+      <a:schemeClr val="accent1">
+        <a:shade val="80000"/>
+      </a:schemeClr>
+    </dgm:fillClrLst>
+    <dgm:linClrLst meth="repeat">
+      <a:schemeClr val="accent1"/>
+    </dgm:linClrLst>
+    <dgm:effectClrLst/>
+    <dgm:txLinClrLst/>
+    <dgm:txFillClrLst meth="repeat">
+      <a:schemeClr val="lt1"/>
+    </dgm:txFillClrLst>
+    <dgm:txEffectClrLst/>
+  </dgm:styleLbl>
+  <dgm:styleLbl name="trBgShp">
+    <dgm:fillClrLst meth="repeat">
+      <a:schemeClr val="accent1">
+        <a:tint val="50000"/>
+        <a:alpha val="40000"/>
+      </a:schemeClr>
+    </dgm:fillClrLst>
+    <dgm:linClrLst meth="repeat">
+      <a:schemeClr val="accent1"/>
+    </dgm:linClrLst>
+    <dgm:effectClrLst/>
+    <dgm:txLinClrLst/>
+    <dgm:txFillClrLst meth="repeat">
+      <a:schemeClr val="lt1"/>
+    </dgm:txFillClrLst>
+    <dgm:txEffectClrLst/>
+  </dgm:styleLbl>
+  <dgm:styleLbl name="fgShp">
+    <dgm:fillClrLst meth="repeat">
+      <a:schemeClr val="accent1">
+        <a:tint val="60000"/>
+      </a:schemeClr>
+    </dgm:fillClrLst>
+    <dgm:linClrLst meth="repeat">
+      <a:schemeClr val="lt1"/>
+    </dgm:linClrLst>
+    <dgm:effectClrLst/>
+    <dgm:txLinClrLst/>
+    <dgm:txFillClrLst meth="repeat">
+      <a:schemeClr val="dk1"/>
+    </dgm:txFillClrLst>
+    <dgm:txEffectClrLst/>
+  </dgm:styleLbl>
+  <dgm:styleLbl name="revTx">
+    <dgm:fillClrLst meth="repeat">
+      <a:schemeClr val="lt1">
+        <a:alpha val="0"/>
+      </a:schemeClr>
+    </dgm:fillClrLst>
+    <dgm:linClrLst meth="repeat">
+      <a:schemeClr val="dk1">
+        <a:alpha val="0"/>
+      </a:schemeClr>
+    </dgm:linClrLst>
+    <dgm:effectClrLst/>
+    <dgm:txLinClrLst/>
+    <dgm:txFillClrLst meth="repeat">
+      <a:schemeClr val="tx1"/>
+    </dgm:txFillClrLst>
+    <dgm:txEffectClrLst/>
+  </dgm:styleLbl>
+</dgm:colorsDef>
+</file>
+
+<file path=ppt/diagrams/data1.xml><?xml version="1.0" encoding="utf-8"?>
+<dgm:dataModel xmlns:dgm="http://schemas.openxmlformats.org/drawingml/2006/diagram" xmlns:a="http://schemas.openxmlformats.org/drawingml/2006/main">
+  <dgm:ptLst>
+    <dgm:pt modelId="{356D004F-A3CA-4BDD-98ED-4D9DE9C4E769}" type="doc">
+      <dgm:prSet loTypeId="urn:microsoft.com/office/officeart/2005/8/layout/hList1" loCatId="list" qsTypeId="urn:microsoft.com/office/officeart/2005/8/quickstyle/simple1" qsCatId="simple" csTypeId="urn:microsoft.com/office/officeart/2005/8/colors/accent1_2" csCatId="accent1" phldr="1"/>
+      <dgm:spPr/>
+      <dgm:t>
+        <a:bodyPr/>
+        <a:lstStyle/>
+        <a:p>
+          <a:endParaRPr lang="en-US"/>
+        </a:p>
+      </dgm:t>
+    </dgm:pt>
+    <dgm:pt modelId="{EEDF9B81-55B8-4B62-915A-0E19AB2F6698}">
+      <dgm:prSet phldrT="[Text]"/>
+      <dgm:spPr/>
+      <dgm:t>
+        <a:bodyPr/>
+        <a:lstStyle/>
+        <a:p>
+          <a:r>
+            <a:rPr lang="en-US" dirty="0"/>
+            <a:t>Blockchain is</a:t>
+          </a:r>
+        </a:p>
+      </dgm:t>
+    </dgm:pt>
+    <dgm:pt modelId="{19960424-466B-40FC-BFE4-2806055E6520}" type="parTrans" cxnId="{AE9036D5-5133-4523-BF62-A2FA002C9F16}">
+      <dgm:prSet/>
+      <dgm:spPr/>
+      <dgm:t>
+        <a:bodyPr/>
+        <a:lstStyle/>
+        <a:p>
+          <a:endParaRPr lang="en-US"/>
+        </a:p>
+      </dgm:t>
+    </dgm:pt>
+    <dgm:pt modelId="{0D5F0F40-4BE5-45EE-B38A-7D9D34023BFA}" type="sibTrans" cxnId="{AE9036D5-5133-4523-BF62-A2FA002C9F16}">
+      <dgm:prSet/>
+      <dgm:spPr/>
+      <dgm:t>
+        <a:bodyPr/>
+        <a:lstStyle/>
+        <a:p>
+          <a:endParaRPr lang="en-US"/>
+        </a:p>
+      </dgm:t>
+    </dgm:pt>
+    <dgm:pt modelId="{1F3C79A8-2FF6-4E36-821E-18155A733A4F}">
+      <dgm:prSet phldrT="[Text]"/>
+      <dgm:spPr/>
+      <dgm:t>
+        <a:bodyPr/>
+        <a:lstStyle/>
+        <a:p>
+          <a:r>
+            <a:rPr lang="en-US" dirty="0"/>
+            <a:t>Distributed</a:t>
+          </a:r>
+        </a:p>
+      </dgm:t>
+    </dgm:pt>
+    <dgm:pt modelId="{F2042999-DE4D-45BC-9E35-1E7748A99262}" type="parTrans" cxnId="{22F46E15-471F-4C7B-83AA-DA25B88B4901}">
+      <dgm:prSet/>
+      <dgm:spPr/>
+      <dgm:t>
+        <a:bodyPr/>
+        <a:lstStyle/>
+        <a:p>
+          <a:endParaRPr lang="en-US"/>
+        </a:p>
+      </dgm:t>
+    </dgm:pt>
+    <dgm:pt modelId="{CF3506CF-3DF9-482F-9965-181EBCDB3C3D}" type="sibTrans" cxnId="{22F46E15-471F-4C7B-83AA-DA25B88B4901}">
+      <dgm:prSet/>
+      <dgm:spPr/>
+      <dgm:t>
+        <a:bodyPr/>
+        <a:lstStyle/>
+        <a:p>
+          <a:endParaRPr lang="en-US"/>
+        </a:p>
+      </dgm:t>
+    </dgm:pt>
+    <dgm:pt modelId="{CA01D07A-72BE-4177-AA94-1098FC84B67F}">
+      <dgm:prSet phldrT="[Text]"/>
+      <dgm:spPr/>
+      <dgm:t>
+        <a:bodyPr/>
+        <a:lstStyle/>
+        <a:p>
+          <a:r>
+            <a:rPr lang="en-US" dirty="0"/>
+            <a:t>Ledger</a:t>
+          </a:r>
+        </a:p>
+      </dgm:t>
+    </dgm:pt>
+    <dgm:pt modelId="{9D243203-04A1-421F-9813-B06C990E6225}" type="parTrans" cxnId="{96422A67-5F43-4FCA-A668-CCAD92FF9667}">
+      <dgm:prSet/>
+      <dgm:spPr/>
+      <dgm:t>
+        <a:bodyPr/>
+        <a:lstStyle/>
+        <a:p>
+          <a:endParaRPr lang="en-US"/>
+        </a:p>
+      </dgm:t>
+    </dgm:pt>
+    <dgm:pt modelId="{5ABAEDCB-E9C0-46FF-982A-15A7F33CE1A3}" type="sibTrans" cxnId="{96422A67-5F43-4FCA-A668-CCAD92FF9667}">
+      <dgm:prSet/>
+      <dgm:spPr/>
+      <dgm:t>
+        <a:bodyPr/>
+        <a:lstStyle/>
+        <a:p>
+          <a:endParaRPr lang="en-US"/>
+        </a:p>
+      </dgm:t>
+    </dgm:pt>
+    <dgm:pt modelId="{726CF531-C850-4BC4-AA89-6984CF57DC76}">
+      <dgm:prSet phldrT="[Text]"/>
+      <dgm:spPr/>
+      <dgm:t>
+        <a:bodyPr/>
+        <a:lstStyle/>
+        <a:p>
+          <a:r>
+            <a:rPr lang="en-US" dirty="0"/>
+            <a:t>Blockchain is </a:t>
+          </a:r>
+          <a:r>
+            <a:rPr lang="en-US" b="1" dirty="0"/>
+            <a:t>NOT</a:t>
+          </a:r>
+        </a:p>
+      </dgm:t>
+    </dgm:pt>
+    <dgm:pt modelId="{266B1EE4-8CAE-4274-AA89-FD9AE9BBDB67}" type="parTrans" cxnId="{47DB6088-AFC5-42C8-9898-EED187DAB9A9}">
+      <dgm:prSet/>
+      <dgm:spPr/>
+      <dgm:t>
+        <a:bodyPr/>
+        <a:lstStyle/>
+        <a:p>
+          <a:endParaRPr lang="en-US"/>
+        </a:p>
+      </dgm:t>
+    </dgm:pt>
+    <dgm:pt modelId="{E9A6207E-7D38-4380-AD93-D52D82BAB5FA}" type="sibTrans" cxnId="{47DB6088-AFC5-42C8-9898-EED187DAB9A9}">
+      <dgm:prSet/>
+      <dgm:spPr/>
+      <dgm:t>
+        <a:bodyPr/>
+        <a:lstStyle/>
+        <a:p>
+          <a:endParaRPr lang="en-US"/>
+        </a:p>
+      </dgm:t>
+    </dgm:pt>
+    <dgm:pt modelId="{4FAFD3DD-5448-445F-9619-FD639C9F32B8}">
+      <dgm:prSet phldrT="[Text]"/>
+      <dgm:spPr/>
+      <dgm:t>
+        <a:bodyPr/>
+        <a:lstStyle/>
+        <a:p>
+          <a:r>
+            <a:rPr lang="en-US" dirty="0"/>
+            <a:t>Bitcoin</a:t>
+          </a:r>
+        </a:p>
+      </dgm:t>
+    </dgm:pt>
+    <dgm:pt modelId="{1AF7C16F-68DE-48B4-A4FF-22BE161B2B4C}" type="parTrans" cxnId="{CDC63C0C-CAFD-461A-BF5C-7CFAE9F4742B}">
+      <dgm:prSet/>
+      <dgm:spPr/>
+      <dgm:t>
+        <a:bodyPr/>
+        <a:lstStyle/>
+        <a:p>
+          <a:endParaRPr lang="en-US"/>
+        </a:p>
+      </dgm:t>
+    </dgm:pt>
+    <dgm:pt modelId="{B9FA6FF0-3463-43D6-A75D-D2DEC10091F0}" type="sibTrans" cxnId="{CDC63C0C-CAFD-461A-BF5C-7CFAE9F4742B}">
+      <dgm:prSet/>
+      <dgm:spPr/>
+      <dgm:t>
+        <a:bodyPr/>
+        <a:lstStyle/>
+        <a:p>
+          <a:endParaRPr lang="en-US"/>
+        </a:p>
+      </dgm:t>
+    </dgm:pt>
+    <dgm:pt modelId="{F30A1290-5D5F-4905-8A36-0211D7EEF903}">
+      <dgm:prSet phldrT="[Text]"/>
+      <dgm:spPr/>
+      <dgm:t>
+        <a:bodyPr/>
+        <a:lstStyle/>
+        <a:p>
+          <a:r>
+            <a:rPr lang="en-US" dirty="0"/>
+            <a:t>Money</a:t>
+          </a:r>
+        </a:p>
+      </dgm:t>
+    </dgm:pt>
+    <dgm:pt modelId="{2EB81B92-C783-48F8-87E9-D63E3461DD7A}" type="parTrans" cxnId="{5ADE28CD-722B-44FD-8F4B-0AAAD7271AE5}">
+      <dgm:prSet/>
+      <dgm:spPr/>
+      <dgm:t>
+        <a:bodyPr/>
+        <a:lstStyle/>
+        <a:p>
+          <a:endParaRPr lang="en-US"/>
+        </a:p>
+      </dgm:t>
+    </dgm:pt>
+    <dgm:pt modelId="{EAF0961E-7526-4182-B120-FBA331E76939}" type="sibTrans" cxnId="{5ADE28CD-722B-44FD-8F4B-0AAAD7271AE5}">
+      <dgm:prSet/>
+      <dgm:spPr/>
+      <dgm:t>
+        <a:bodyPr/>
+        <a:lstStyle/>
+        <a:p>
+          <a:endParaRPr lang="en-US"/>
+        </a:p>
+      </dgm:t>
+    </dgm:pt>
+    <dgm:pt modelId="{59219A60-0B7E-4672-83E3-8624357915D8}">
+      <dgm:prSet phldrT="[Text]"/>
+      <dgm:spPr/>
+      <dgm:t>
+        <a:bodyPr/>
+        <a:lstStyle/>
+        <a:p>
+          <a:r>
+            <a:rPr lang="en-US" dirty="0"/>
+            <a:t>P2P</a:t>
+          </a:r>
+        </a:p>
+      </dgm:t>
+    </dgm:pt>
+    <dgm:pt modelId="{B877420E-88D9-4A00-BC6C-B041061C69EA}" type="parTrans" cxnId="{6DD1B439-3B2E-4C0B-953C-DF8D0783EC2B}">
+      <dgm:prSet/>
+      <dgm:spPr/>
+      <dgm:t>
+        <a:bodyPr/>
+        <a:lstStyle/>
+        <a:p>
+          <a:endParaRPr lang="en-US"/>
+        </a:p>
+      </dgm:t>
+    </dgm:pt>
+    <dgm:pt modelId="{780D4793-EA5B-450D-9C53-2C41371CB165}" type="sibTrans" cxnId="{6DD1B439-3B2E-4C0B-953C-DF8D0783EC2B}">
+      <dgm:prSet/>
+      <dgm:spPr/>
+      <dgm:t>
+        <a:bodyPr/>
+        <a:lstStyle/>
+        <a:p>
+          <a:endParaRPr lang="en-US"/>
+        </a:p>
+      </dgm:t>
+    </dgm:pt>
+    <dgm:pt modelId="{A2709171-A55D-4FCF-9B5E-4378FB70D62C}">
+      <dgm:prSet phldrT="[Text]"/>
+      <dgm:spPr/>
+      <dgm:t>
+        <a:bodyPr/>
+        <a:lstStyle/>
+        <a:p>
+          <a:r>
+            <a:rPr lang="en-US" dirty="0"/>
+            <a:t>Immutable</a:t>
+          </a:r>
+        </a:p>
+      </dgm:t>
+    </dgm:pt>
+    <dgm:pt modelId="{826A521C-532A-426A-9440-C95329A9BC80}" type="parTrans" cxnId="{FDF8FF23-EDEB-407B-B37A-78F8F2E843D7}">
+      <dgm:prSet/>
+      <dgm:spPr/>
+      <dgm:t>
+        <a:bodyPr/>
+        <a:lstStyle/>
+        <a:p>
+          <a:endParaRPr lang="en-US"/>
+        </a:p>
+      </dgm:t>
+    </dgm:pt>
+    <dgm:pt modelId="{B670A778-3229-44A9-9ECC-512BE70D2B7C}" type="sibTrans" cxnId="{FDF8FF23-EDEB-407B-B37A-78F8F2E843D7}">
+      <dgm:prSet/>
+      <dgm:spPr/>
+      <dgm:t>
+        <a:bodyPr/>
+        <a:lstStyle/>
+        <a:p>
+          <a:endParaRPr lang="en-US"/>
+        </a:p>
+      </dgm:t>
+    </dgm:pt>
+    <dgm:pt modelId="{51E9E8D2-8B11-4041-B096-6C50EA38F90D}">
+      <dgm:prSet phldrT="[Text]"/>
+      <dgm:spPr/>
+      <dgm:t>
+        <a:bodyPr/>
+        <a:lstStyle/>
+        <a:p>
+          <a:r>
+            <a:rPr lang="en-US" dirty="0"/>
+            <a:t>Mastercard</a:t>
+          </a:r>
+        </a:p>
+      </dgm:t>
+    </dgm:pt>
+    <dgm:pt modelId="{108237E3-E124-46E7-B43D-6655B4559535}" type="parTrans" cxnId="{D134C50C-8776-40D1-BF47-CB6EFC265858}">
+      <dgm:prSet/>
+      <dgm:spPr/>
+      <dgm:t>
+        <a:bodyPr/>
+        <a:lstStyle/>
+        <a:p>
+          <a:endParaRPr lang="en-US"/>
+        </a:p>
+      </dgm:t>
+    </dgm:pt>
+    <dgm:pt modelId="{D6AFE53A-5A28-4671-9897-639953457634}" type="sibTrans" cxnId="{D134C50C-8776-40D1-BF47-CB6EFC265858}">
+      <dgm:prSet/>
+      <dgm:spPr/>
+      <dgm:t>
+        <a:bodyPr/>
+        <a:lstStyle/>
+        <a:p>
+          <a:endParaRPr lang="en-US"/>
+        </a:p>
+      </dgm:t>
+    </dgm:pt>
+    <dgm:pt modelId="{802292E4-D058-46D5-97B2-CE595A49CB8C}">
+      <dgm:prSet phldrT="[Text]"/>
+      <dgm:spPr/>
+      <dgm:t>
+        <a:bodyPr/>
+        <a:lstStyle/>
+        <a:p>
+          <a:r>
+            <a:rPr lang="en-US" dirty="0"/>
+            <a:t>A Messenger</a:t>
+          </a:r>
+        </a:p>
+      </dgm:t>
+    </dgm:pt>
+    <dgm:pt modelId="{BB4B96FC-22E0-4116-86E4-DFCF0C670CFE}" type="parTrans" cxnId="{DE40FB6F-FC16-4115-8E8C-266D28FEAFFD}">
+      <dgm:prSet/>
+      <dgm:spPr/>
+      <dgm:t>
+        <a:bodyPr/>
+        <a:lstStyle/>
+        <a:p>
+          <a:endParaRPr lang="en-US"/>
+        </a:p>
+      </dgm:t>
+    </dgm:pt>
+    <dgm:pt modelId="{0E19963E-F6FB-469E-ADE0-CBD97360346B}" type="sibTrans" cxnId="{DE40FB6F-FC16-4115-8E8C-266D28FEAFFD}">
+      <dgm:prSet/>
+      <dgm:spPr/>
+      <dgm:t>
+        <a:bodyPr/>
+        <a:lstStyle/>
+        <a:p>
+          <a:endParaRPr lang="en-US"/>
+        </a:p>
+      </dgm:t>
+    </dgm:pt>
+    <dgm:pt modelId="{7B1454CB-8E30-46D8-A490-F647D770A362}">
+      <dgm:prSet phldrT="[Text]"/>
+      <dgm:spPr/>
+      <dgm:t>
+        <a:bodyPr/>
+        <a:lstStyle/>
+        <a:p>
+          <a:r>
+            <a:rPr lang="en-US" dirty="0"/>
+            <a:t>A Database</a:t>
+          </a:r>
+        </a:p>
+      </dgm:t>
+    </dgm:pt>
+    <dgm:pt modelId="{BA5084CF-6292-43BF-BB45-D559AC383EB1}" type="parTrans" cxnId="{CC70BDAA-5A26-4B6A-B54D-2CDE7FE350B3}">
+      <dgm:prSet/>
+      <dgm:spPr/>
+      <dgm:t>
+        <a:bodyPr/>
+        <a:lstStyle/>
+        <a:p>
+          <a:endParaRPr lang="en-US"/>
+        </a:p>
+      </dgm:t>
+    </dgm:pt>
+    <dgm:pt modelId="{54069918-1D52-4069-B031-CB6EFC2F7CBC}" type="sibTrans" cxnId="{CC70BDAA-5A26-4B6A-B54D-2CDE7FE350B3}">
+      <dgm:prSet/>
+      <dgm:spPr/>
+      <dgm:t>
+        <a:bodyPr/>
+        <a:lstStyle/>
+        <a:p>
+          <a:endParaRPr lang="en-US"/>
+        </a:p>
+      </dgm:t>
+    </dgm:pt>
+    <dgm:pt modelId="{52CA4C8A-550B-4F02-8116-F9B57D61D46B}" type="pres">
+      <dgm:prSet presAssocID="{356D004F-A3CA-4BDD-98ED-4D9DE9C4E769}" presName="Name0" presStyleCnt="0">
+        <dgm:presLayoutVars>
+          <dgm:dir/>
+          <dgm:animLvl val="lvl"/>
+          <dgm:resizeHandles val="exact"/>
+        </dgm:presLayoutVars>
+      </dgm:prSet>
+      <dgm:spPr/>
+    </dgm:pt>
+    <dgm:pt modelId="{058B37FE-24FF-474A-8E34-230C6157B812}" type="pres">
+      <dgm:prSet presAssocID="{EEDF9B81-55B8-4B62-915A-0E19AB2F6698}" presName="composite" presStyleCnt="0"/>
+      <dgm:spPr/>
+    </dgm:pt>
+    <dgm:pt modelId="{67890CEF-FAA2-4393-A5EA-8FF46EBF9B3A}" type="pres">
+      <dgm:prSet presAssocID="{EEDF9B81-55B8-4B62-915A-0E19AB2F6698}" presName="parTx" presStyleLbl="alignNode1" presStyleIdx="0" presStyleCnt="2">
+        <dgm:presLayoutVars>
+          <dgm:chMax val="0"/>
+          <dgm:chPref val="0"/>
+          <dgm:bulletEnabled val="1"/>
+        </dgm:presLayoutVars>
+      </dgm:prSet>
+      <dgm:spPr/>
+    </dgm:pt>
+    <dgm:pt modelId="{28F4C583-B99D-4166-BFBC-D68085F66483}" type="pres">
+      <dgm:prSet presAssocID="{EEDF9B81-55B8-4B62-915A-0E19AB2F6698}" presName="desTx" presStyleLbl="alignAccFollowNode1" presStyleIdx="0" presStyleCnt="2">
+        <dgm:presLayoutVars>
+          <dgm:bulletEnabled val="1"/>
+        </dgm:presLayoutVars>
+      </dgm:prSet>
+      <dgm:spPr/>
+    </dgm:pt>
+    <dgm:pt modelId="{8AB2C044-F0C8-4F3D-A8A3-52FC641CEEC7}" type="pres">
+      <dgm:prSet presAssocID="{0D5F0F40-4BE5-45EE-B38A-7D9D34023BFA}" presName="space" presStyleCnt="0"/>
+      <dgm:spPr/>
+    </dgm:pt>
+    <dgm:pt modelId="{121C02E7-BBA8-435E-87CD-443E47951A2A}" type="pres">
+      <dgm:prSet presAssocID="{726CF531-C850-4BC4-AA89-6984CF57DC76}" presName="composite" presStyleCnt="0"/>
+      <dgm:spPr/>
+    </dgm:pt>
+    <dgm:pt modelId="{9B0FB4A8-2813-4B30-837A-AE72A70010BA}" type="pres">
+      <dgm:prSet presAssocID="{726CF531-C850-4BC4-AA89-6984CF57DC76}" presName="parTx" presStyleLbl="alignNode1" presStyleIdx="1" presStyleCnt="2">
+        <dgm:presLayoutVars>
+          <dgm:chMax val="0"/>
+          <dgm:chPref val="0"/>
+          <dgm:bulletEnabled val="1"/>
+        </dgm:presLayoutVars>
+      </dgm:prSet>
+      <dgm:spPr/>
+    </dgm:pt>
+    <dgm:pt modelId="{5AB863F8-DED0-4A61-82BF-E4F222977382}" type="pres">
+      <dgm:prSet presAssocID="{726CF531-C850-4BC4-AA89-6984CF57DC76}" presName="desTx" presStyleLbl="alignAccFollowNode1" presStyleIdx="1" presStyleCnt="2">
+        <dgm:presLayoutVars>
+          <dgm:bulletEnabled val="1"/>
+        </dgm:presLayoutVars>
+      </dgm:prSet>
+      <dgm:spPr/>
+    </dgm:pt>
+  </dgm:ptLst>
+  <dgm:cxnLst>
+    <dgm:cxn modelId="{CDC63C0C-CAFD-461A-BF5C-7CFAE9F4742B}" srcId="{726CF531-C850-4BC4-AA89-6984CF57DC76}" destId="{4FAFD3DD-5448-445F-9619-FD639C9F32B8}" srcOrd="0" destOrd="0" parTransId="{1AF7C16F-68DE-48B4-A4FF-22BE161B2B4C}" sibTransId="{B9FA6FF0-3463-43D6-A75D-D2DEC10091F0}"/>
+    <dgm:cxn modelId="{C891900C-A957-497A-9A27-B44173ABE760}" type="presOf" srcId="{CA01D07A-72BE-4177-AA94-1098FC84B67F}" destId="{28F4C583-B99D-4166-BFBC-D68085F66483}" srcOrd="0" destOrd="1" presId="urn:microsoft.com/office/officeart/2005/8/layout/hList1"/>
+    <dgm:cxn modelId="{D134C50C-8776-40D1-BF47-CB6EFC265858}" srcId="{726CF531-C850-4BC4-AA89-6984CF57DC76}" destId="{51E9E8D2-8B11-4041-B096-6C50EA38F90D}" srcOrd="2" destOrd="0" parTransId="{108237E3-E124-46E7-B43D-6655B4559535}" sibTransId="{D6AFE53A-5A28-4671-9897-639953457634}"/>
+    <dgm:cxn modelId="{100C590E-E404-472C-9592-FE8A9EF028F0}" type="presOf" srcId="{356D004F-A3CA-4BDD-98ED-4D9DE9C4E769}" destId="{52CA4C8A-550B-4F02-8116-F9B57D61D46B}" srcOrd="0" destOrd="0" presId="urn:microsoft.com/office/officeart/2005/8/layout/hList1"/>
+    <dgm:cxn modelId="{22F46E15-471F-4C7B-83AA-DA25B88B4901}" srcId="{EEDF9B81-55B8-4B62-915A-0E19AB2F6698}" destId="{1F3C79A8-2FF6-4E36-821E-18155A733A4F}" srcOrd="0" destOrd="0" parTransId="{F2042999-DE4D-45BC-9E35-1E7748A99262}" sibTransId="{CF3506CF-3DF9-482F-9965-181EBCDB3C3D}"/>
+    <dgm:cxn modelId="{FDF8FF23-EDEB-407B-B37A-78F8F2E843D7}" srcId="{EEDF9B81-55B8-4B62-915A-0E19AB2F6698}" destId="{A2709171-A55D-4FCF-9B5E-4378FB70D62C}" srcOrd="3" destOrd="0" parTransId="{826A521C-532A-426A-9440-C95329A9BC80}" sibTransId="{B670A778-3229-44A9-9ECC-512BE70D2B7C}"/>
+    <dgm:cxn modelId="{7E395C2F-02DC-4F20-B134-87DF67A31662}" type="presOf" srcId="{802292E4-D058-46D5-97B2-CE595A49CB8C}" destId="{5AB863F8-DED0-4A61-82BF-E4F222977382}" srcOrd="0" destOrd="3" presId="urn:microsoft.com/office/officeart/2005/8/layout/hList1"/>
+    <dgm:cxn modelId="{44189D30-AEA0-4F1C-843B-986CFFAF6C2D}" type="presOf" srcId="{A2709171-A55D-4FCF-9B5E-4378FB70D62C}" destId="{28F4C583-B99D-4166-BFBC-D68085F66483}" srcOrd="0" destOrd="3" presId="urn:microsoft.com/office/officeart/2005/8/layout/hList1"/>
+    <dgm:cxn modelId="{6DD1B439-3B2E-4C0B-953C-DF8D0783EC2B}" srcId="{EEDF9B81-55B8-4B62-915A-0E19AB2F6698}" destId="{59219A60-0B7E-4672-83E3-8624357915D8}" srcOrd="2" destOrd="0" parTransId="{B877420E-88D9-4A00-BC6C-B041061C69EA}" sibTransId="{780D4793-EA5B-450D-9C53-2C41371CB165}"/>
+    <dgm:cxn modelId="{96422A67-5F43-4FCA-A668-CCAD92FF9667}" srcId="{EEDF9B81-55B8-4B62-915A-0E19AB2F6698}" destId="{CA01D07A-72BE-4177-AA94-1098FC84B67F}" srcOrd="1" destOrd="0" parTransId="{9D243203-04A1-421F-9813-B06C990E6225}" sibTransId="{5ABAEDCB-E9C0-46FF-982A-15A7F33CE1A3}"/>
+    <dgm:cxn modelId="{DE40FB6F-FC16-4115-8E8C-266D28FEAFFD}" srcId="{726CF531-C850-4BC4-AA89-6984CF57DC76}" destId="{802292E4-D058-46D5-97B2-CE595A49CB8C}" srcOrd="3" destOrd="0" parTransId="{BB4B96FC-22E0-4116-86E4-DFCF0C670CFE}" sibTransId="{0E19963E-F6FB-469E-ADE0-CBD97360346B}"/>
+    <dgm:cxn modelId="{F7A2DE72-6544-4EEA-ACE8-8ACECF7EF27F}" type="presOf" srcId="{1F3C79A8-2FF6-4E36-821E-18155A733A4F}" destId="{28F4C583-B99D-4166-BFBC-D68085F66483}" srcOrd="0" destOrd="0" presId="urn:microsoft.com/office/officeart/2005/8/layout/hList1"/>
+    <dgm:cxn modelId="{0431D954-34A6-42B8-BF02-25362060B438}" type="presOf" srcId="{F30A1290-5D5F-4905-8A36-0211D7EEF903}" destId="{5AB863F8-DED0-4A61-82BF-E4F222977382}" srcOrd="0" destOrd="1" presId="urn:microsoft.com/office/officeart/2005/8/layout/hList1"/>
+    <dgm:cxn modelId="{E85AD783-D372-4C84-A501-2A11AF9E451D}" type="presOf" srcId="{726CF531-C850-4BC4-AA89-6984CF57DC76}" destId="{9B0FB4A8-2813-4B30-837A-AE72A70010BA}" srcOrd="0" destOrd="0" presId="urn:microsoft.com/office/officeart/2005/8/layout/hList1"/>
+    <dgm:cxn modelId="{56326B84-DD92-4B58-B30C-52CBB91FE8FF}" type="presOf" srcId="{51E9E8D2-8B11-4041-B096-6C50EA38F90D}" destId="{5AB863F8-DED0-4A61-82BF-E4F222977382}" srcOrd="0" destOrd="2" presId="urn:microsoft.com/office/officeart/2005/8/layout/hList1"/>
+    <dgm:cxn modelId="{47DB6088-AFC5-42C8-9898-EED187DAB9A9}" srcId="{356D004F-A3CA-4BDD-98ED-4D9DE9C4E769}" destId="{726CF531-C850-4BC4-AA89-6984CF57DC76}" srcOrd="1" destOrd="0" parTransId="{266B1EE4-8CAE-4274-AA89-FD9AE9BBDB67}" sibTransId="{E9A6207E-7D38-4380-AD93-D52D82BAB5FA}"/>
+    <dgm:cxn modelId="{CC70BDAA-5A26-4B6A-B54D-2CDE7FE350B3}" srcId="{726CF531-C850-4BC4-AA89-6984CF57DC76}" destId="{7B1454CB-8E30-46D8-A490-F647D770A362}" srcOrd="4" destOrd="0" parTransId="{BA5084CF-6292-43BF-BB45-D559AC383EB1}" sibTransId="{54069918-1D52-4069-B031-CB6EFC2F7CBC}"/>
+    <dgm:cxn modelId="{E5C623C2-DC52-4584-B602-D306523378B1}" type="presOf" srcId="{4FAFD3DD-5448-445F-9619-FD639C9F32B8}" destId="{5AB863F8-DED0-4A61-82BF-E4F222977382}" srcOrd="0" destOrd="0" presId="urn:microsoft.com/office/officeart/2005/8/layout/hList1"/>
+    <dgm:cxn modelId="{5ADE28CD-722B-44FD-8F4B-0AAAD7271AE5}" srcId="{726CF531-C850-4BC4-AA89-6984CF57DC76}" destId="{F30A1290-5D5F-4905-8A36-0211D7EEF903}" srcOrd="1" destOrd="0" parTransId="{2EB81B92-C783-48F8-87E9-D63E3461DD7A}" sibTransId="{EAF0961E-7526-4182-B120-FBA331E76939}"/>
+    <dgm:cxn modelId="{AE9036D5-5133-4523-BF62-A2FA002C9F16}" srcId="{356D004F-A3CA-4BDD-98ED-4D9DE9C4E769}" destId="{EEDF9B81-55B8-4B62-915A-0E19AB2F6698}" srcOrd="0" destOrd="0" parTransId="{19960424-466B-40FC-BFE4-2806055E6520}" sibTransId="{0D5F0F40-4BE5-45EE-B38A-7D9D34023BFA}"/>
+    <dgm:cxn modelId="{854B7FEA-90EF-47FB-BA4C-C67D49EF5B78}" type="presOf" srcId="{59219A60-0B7E-4672-83E3-8624357915D8}" destId="{28F4C583-B99D-4166-BFBC-D68085F66483}" srcOrd="0" destOrd="2" presId="urn:microsoft.com/office/officeart/2005/8/layout/hList1"/>
+    <dgm:cxn modelId="{DE89FEFB-0CD5-440F-BD56-3277F708739A}" type="presOf" srcId="{EEDF9B81-55B8-4B62-915A-0E19AB2F6698}" destId="{67890CEF-FAA2-4393-A5EA-8FF46EBF9B3A}" srcOrd="0" destOrd="0" presId="urn:microsoft.com/office/officeart/2005/8/layout/hList1"/>
+    <dgm:cxn modelId="{9671AAFF-6F22-4C56-A9EC-CAA0C16357CF}" type="presOf" srcId="{7B1454CB-8E30-46D8-A490-F647D770A362}" destId="{5AB863F8-DED0-4A61-82BF-E4F222977382}" srcOrd="0" destOrd="4" presId="urn:microsoft.com/office/officeart/2005/8/layout/hList1"/>
+    <dgm:cxn modelId="{A7A4734E-690F-45F3-BC8D-F07F0EDEDB94}" type="presParOf" srcId="{52CA4C8A-550B-4F02-8116-F9B57D61D46B}" destId="{058B37FE-24FF-474A-8E34-230C6157B812}" srcOrd="0" destOrd="0" presId="urn:microsoft.com/office/officeart/2005/8/layout/hList1"/>
+    <dgm:cxn modelId="{76AA4441-E723-4AFF-B667-1135AD97BEAA}" type="presParOf" srcId="{058B37FE-24FF-474A-8E34-230C6157B812}" destId="{67890CEF-FAA2-4393-A5EA-8FF46EBF9B3A}" srcOrd="0" destOrd="0" presId="urn:microsoft.com/office/officeart/2005/8/layout/hList1"/>
+    <dgm:cxn modelId="{03B1A6B2-013A-4EE0-B7AE-A541B8A44F19}" type="presParOf" srcId="{058B37FE-24FF-474A-8E34-230C6157B812}" destId="{28F4C583-B99D-4166-BFBC-D68085F66483}" srcOrd="1" destOrd="0" presId="urn:microsoft.com/office/officeart/2005/8/layout/hList1"/>
+    <dgm:cxn modelId="{FC3BDCC0-CC90-4951-B6BB-52BDB13908B1}" type="presParOf" srcId="{52CA4C8A-550B-4F02-8116-F9B57D61D46B}" destId="{8AB2C044-F0C8-4F3D-A8A3-52FC641CEEC7}" srcOrd="1" destOrd="0" presId="urn:microsoft.com/office/officeart/2005/8/layout/hList1"/>
+    <dgm:cxn modelId="{5C8AD58A-8C5B-42FF-8159-4FA6CBADB229}" type="presParOf" srcId="{52CA4C8A-550B-4F02-8116-F9B57D61D46B}" destId="{121C02E7-BBA8-435E-87CD-443E47951A2A}" srcOrd="2" destOrd="0" presId="urn:microsoft.com/office/officeart/2005/8/layout/hList1"/>
+    <dgm:cxn modelId="{09047FAF-6BFA-4D60-8CB8-BAE2A4695760}" type="presParOf" srcId="{121C02E7-BBA8-435E-87CD-443E47951A2A}" destId="{9B0FB4A8-2813-4B30-837A-AE72A70010BA}" srcOrd="0" destOrd="0" presId="urn:microsoft.com/office/officeart/2005/8/layout/hList1"/>
+    <dgm:cxn modelId="{D8141BE9-015C-4D81-978C-605E2579D166}" type="presParOf" srcId="{121C02E7-BBA8-435E-87CD-443E47951A2A}" destId="{5AB863F8-DED0-4A61-82BF-E4F222977382}" srcOrd="1" destOrd="0" presId="urn:microsoft.com/office/officeart/2005/8/layout/hList1"/>
+  </dgm:cxnLst>
+  <dgm:bg/>
+  <dgm:whole/>
+  <dgm:extLst>
+    <a:ext uri="http://schemas.microsoft.com/office/drawing/2008/diagram">
+      <dsp:dataModelExt xmlns:dsp="http://schemas.microsoft.com/office/drawing/2008/diagram" relId="rId6" minVer="http://schemas.openxmlformats.org/drawingml/2006/diagram"/>
+    </a:ext>
+  </dgm:extLst>
+</dgm:dataModel>
+</file>
+
+<file path=ppt/diagrams/drawing1.xml><?xml version="1.0" encoding="utf-8"?>
+<dsp:drawing xmlns:dgm="http://schemas.openxmlformats.org/drawingml/2006/diagram" xmlns:dsp="http://schemas.microsoft.com/office/drawing/2008/diagram" xmlns:a="http://schemas.openxmlformats.org/drawingml/2006/main">
+  <dsp:spTree>
+    <dsp:nvGrpSpPr>
+      <dsp:cNvPr id="0" name=""/>
+      <dsp:cNvGrpSpPr/>
+    </dsp:nvGrpSpPr>
+    <dsp:grpSpPr/>
+    <dsp:sp modelId="{67890CEF-FAA2-4393-A5EA-8FF46EBF9B3A}">
+      <dsp:nvSpPr>
+        <dsp:cNvPr id="0" name=""/>
+        <dsp:cNvSpPr/>
+      </dsp:nvSpPr>
+      <dsp:spPr>
+        <a:xfrm>
+          <a:off x="24" y="50558"/>
+          <a:ext cx="2351923" cy="633600"/>
+        </a:xfrm>
+        <a:prstGeom prst="rect">
+          <a:avLst/>
+        </a:prstGeom>
+        <a:solidFill>
+          <a:schemeClr val="accent1">
+            <a:hueOff val="0"/>
+            <a:satOff val="0"/>
+            <a:lumOff val="0"/>
+            <a:alphaOff val="0"/>
+          </a:schemeClr>
+        </a:solidFill>
+        <a:ln w="25400" cap="flat" cmpd="sng" algn="ctr">
+          <a:solidFill>
+            <a:schemeClr val="accent1">
+              <a:hueOff val="0"/>
+              <a:satOff val="0"/>
+              <a:lumOff val="0"/>
+              <a:alphaOff val="0"/>
+            </a:schemeClr>
+          </a:solidFill>
+          <a:prstDash val="solid"/>
+        </a:ln>
+        <a:effectLst/>
+      </dsp:spPr>
+      <dsp:style>
+        <a:lnRef idx="2">
+          <a:scrgbClr r="0" g="0" b="0"/>
+        </a:lnRef>
+        <a:fillRef idx="1">
+          <a:scrgbClr r="0" g="0" b="0"/>
+        </a:fillRef>
+        <a:effectRef idx="0">
+          <a:scrgbClr r="0" g="0" b="0"/>
+        </a:effectRef>
+        <a:fontRef idx="minor">
+          <a:schemeClr val="lt1"/>
+        </a:fontRef>
+      </dsp:style>
+      <dsp:txBody>
+        <a:bodyPr spcFirstLastPara="0" vert="horz" wrap="square" lIns="156464" tIns="89408" rIns="156464" bIns="89408" numCol="1" spcCol="1270" anchor="ctr" anchorCtr="0">
+          <a:noAutofit/>
+        </a:bodyPr>
+        <a:lstStyle/>
+        <a:p>
+          <a:pPr marL="0" lvl="0" indent="0" algn="ctr" defTabSz="977900">
+            <a:lnSpc>
+              <a:spcPct val="90000"/>
+            </a:lnSpc>
+            <a:spcBef>
+              <a:spcPct val="0"/>
+            </a:spcBef>
+            <a:spcAft>
+              <a:spcPct val="35000"/>
+            </a:spcAft>
+            <a:buNone/>
+          </a:pPr>
+          <a:r>
+            <a:rPr lang="en-US" sz="2200" kern="1200" dirty="0"/>
+            <a:t>Blockchain is</a:t>
+          </a:r>
+        </a:p>
+      </dsp:txBody>
+      <dsp:txXfrm>
+        <a:off x="24" y="50558"/>
+        <a:ext cx="2351923" cy="633600"/>
+      </dsp:txXfrm>
+    </dsp:sp>
+    <dsp:sp modelId="{28F4C583-B99D-4166-BFBC-D68085F66483}">
+      <dsp:nvSpPr>
+        <dsp:cNvPr id="0" name=""/>
+        <dsp:cNvSpPr/>
+      </dsp:nvSpPr>
+      <dsp:spPr>
+        <a:xfrm>
+          <a:off x="24" y="684158"/>
+          <a:ext cx="2351923" cy="2060808"/>
+        </a:xfrm>
+        <a:prstGeom prst="rect">
+          <a:avLst/>
+        </a:prstGeom>
+        <a:solidFill>
+          <a:schemeClr val="accent1">
+            <a:alpha val="90000"/>
+            <a:tint val="40000"/>
+            <a:hueOff val="0"/>
+            <a:satOff val="0"/>
+            <a:lumOff val="0"/>
+            <a:alphaOff val="0"/>
+          </a:schemeClr>
+        </a:solidFill>
+        <a:ln w="25400" cap="flat" cmpd="sng" algn="ctr">
+          <a:solidFill>
+            <a:schemeClr val="accent1">
+              <a:alpha val="90000"/>
+              <a:tint val="40000"/>
+              <a:hueOff val="0"/>
+              <a:satOff val="0"/>
+              <a:lumOff val="0"/>
+              <a:alphaOff val="0"/>
+            </a:schemeClr>
+          </a:solidFill>
+          <a:prstDash val="solid"/>
+        </a:ln>
+        <a:effectLst/>
+      </dsp:spPr>
+      <dsp:style>
+        <a:lnRef idx="2">
+          <a:scrgbClr r="0" g="0" b="0"/>
+        </a:lnRef>
+        <a:fillRef idx="1">
+          <a:scrgbClr r="0" g="0" b="0"/>
+        </a:fillRef>
+        <a:effectRef idx="0">
+          <a:scrgbClr r="0" g="0" b="0"/>
+        </a:effectRef>
+        <a:fontRef idx="minor"/>
+      </dsp:style>
+      <dsp:txBody>
+        <a:bodyPr spcFirstLastPara="0" vert="horz" wrap="square" lIns="117348" tIns="117348" rIns="156464" bIns="176022" numCol="1" spcCol="1270" anchor="t" anchorCtr="0">
+          <a:noAutofit/>
+        </a:bodyPr>
+        <a:lstStyle/>
+        <a:p>
+          <a:pPr marL="228600" lvl="1" indent="-228600" algn="l" defTabSz="977900">
+            <a:lnSpc>
+              <a:spcPct val="90000"/>
+            </a:lnSpc>
+            <a:spcBef>
+              <a:spcPct val="0"/>
+            </a:spcBef>
+            <a:spcAft>
+              <a:spcPct val="15000"/>
+            </a:spcAft>
+            <a:buChar char="•"/>
+          </a:pPr>
+          <a:r>
+            <a:rPr lang="en-US" sz="2200" kern="1200" dirty="0"/>
+            <a:t>Distributed</a:t>
+          </a:r>
+        </a:p>
+        <a:p>
+          <a:pPr marL="228600" lvl="1" indent="-228600" algn="l" defTabSz="977900">
+            <a:lnSpc>
+              <a:spcPct val="90000"/>
+            </a:lnSpc>
+            <a:spcBef>
+              <a:spcPct val="0"/>
+            </a:spcBef>
+            <a:spcAft>
+              <a:spcPct val="15000"/>
+            </a:spcAft>
+            <a:buChar char="•"/>
+          </a:pPr>
+          <a:r>
+            <a:rPr lang="en-US" sz="2200" kern="1200" dirty="0"/>
+            <a:t>Ledger</a:t>
+          </a:r>
+        </a:p>
+        <a:p>
+          <a:pPr marL="228600" lvl="1" indent="-228600" algn="l" defTabSz="977900">
+            <a:lnSpc>
+              <a:spcPct val="90000"/>
+            </a:lnSpc>
+            <a:spcBef>
+              <a:spcPct val="0"/>
+            </a:spcBef>
+            <a:spcAft>
+              <a:spcPct val="15000"/>
+            </a:spcAft>
+            <a:buChar char="•"/>
+          </a:pPr>
+          <a:r>
+            <a:rPr lang="en-US" sz="2200" kern="1200" dirty="0"/>
+            <a:t>P2P</a:t>
+          </a:r>
+        </a:p>
+        <a:p>
+          <a:pPr marL="228600" lvl="1" indent="-228600" algn="l" defTabSz="977900">
+            <a:lnSpc>
+              <a:spcPct val="90000"/>
+            </a:lnSpc>
+            <a:spcBef>
+              <a:spcPct val="0"/>
+            </a:spcBef>
+            <a:spcAft>
+              <a:spcPct val="15000"/>
+            </a:spcAft>
+            <a:buChar char="•"/>
+          </a:pPr>
+          <a:r>
+            <a:rPr lang="en-US" sz="2200" kern="1200" dirty="0"/>
+            <a:t>Immutable</a:t>
+          </a:r>
+        </a:p>
+      </dsp:txBody>
+      <dsp:txXfrm>
+        <a:off x="24" y="684158"/>
+        <a:ext cx="2351923" cy="2060808"/>
+      </dsp:txXfrm>
+    </dsp:sp>
+    <dsp:sp modelId="{9B0FB4A8-2813-4B30-837A-AE72A70010BA}">
+      <dsp:nvSpPr>
+        <dsp:cNvPr id="0" name=""/>
+        <dsp:cNvSpPr/>
+      </dsp:nvSpPr>
+      <dsp:spPr>
+        <a:xfrm>
+          <a:off x="2681217" y="50558"/>
+          <a:ext cx="2351923" cy="633600"/>
+        </a:xfrm>
+        <a:prstGeom prst="rect">
+          <a:avLst/>
+        </a:prstGeom>
+        <a:solidFill>
+          <a:schemeClr val="accent1">
+            <a:hueOff val="0"/>
+            <a:satOff val="0"/>
+            <a:lumOff val="0"/>
+            <a:alphaOff val="0"/>
+          </a:schemeClr>
+        </a:solidFill>
+        <a:ln w="25400" cap="flat" cmpd="sng" algn="ctr">
+          <a:solidFill>
+            <a:schemeClr val="accent1">
+              <a:hueOff val="0"/>
+              <a:satOff val="0"/>
+              <a:lumOff val="0"/>
+              <a:alphaOff val="0"/>
+            </a:schemeClr>
+          </a:solidFill>
+          <a:prstDash val="solid"/>
+        </a:ln>
+        <a:effectLst/>
+      </dsp:spPr>
+      <dsp:style>
+        <a:lnRef idx="2">
+          <a:scrgbClr r="0" g="0" b="0"/>
+        </a:lnRef>
+        <a:fillRef idx="1">
+          <a:scrgbClr r="0" g="0" b="0"/>
+        </a:fillRef>
+        <a:effectRef idx="0">
+          <a:scrgbClr r="0" g="0" b="0"/>
+        </a:effectRef>
+        <a:fontRef idx="minor">
+          <a:schemeClr val="lt1"/>
+        </a:fontRef>
+      </dsp:style>
+      <dsp:txBody>
+        <a:bodyPr spcFirstLastPara="0" vert="horz" wrap="square" lIns="156464" tIns="89408" rIns="156464" bIns="89408" numCol="1" spcCol="1270" anchor="ctr" anchorCtr="0">
+          <a:noAutofit/>
+        </a:bodyPr>
+        <a:lstStyle/>
+        <a:p>
+          <a:pPr marL="0" lvl="0" indent="0" algn="ctr" defTabSz="977900">
+            <a:lnSpc>
+              <a:spcPct val="90000"/>
+            </a:lnSpc>
+            <a:spcBef>
+              <a:spcPct val="0"/>
+            </a:spcBef>
+            <a:spcAft>
+              <a:spcPct val="35000"/>
+            </a:spcAft>
+            <a:buNone/>
+          </a:pPr>
+          <a:r>
+            <a:rPr lang="en-US" sz="2200" kern="1200" dirty="0"/>
+            <a:t>Blockchain is </a:t>
+          </a:r>
+          <a:r>
+            <a:rPr lang="en-US" sz="2200" b="1" kern="1200" dirty="0"/>
+            <a:t>NOT</a:t>
+          </a:r>
+        </a:p>
+      </dsp:txBody>
+      <dsp:txXfrm>
+        <a:off x="2681217" y="50558"/>
+        <a:ext cx="2351923" cy="633600"/>
+      </dsp:txXfrm>
+    </dsp:sp>
+    <dsp:sp modelId="{5AB863F8-DED0-4A61-82BF-E4F222977382}">
+      <dsp:nvSpPr>
+        <dsp:cNvPr id="0" name=""/>
+        <dsp:cNvSpPr/>
+      </dsp:nvSpPr>
+      <dsp:spPr>
+        <a:xfrm>
+          <a:off x="2681217" y="684158"/>
+          <a:ext cx="2351923" cy="2060808"/>
+        </a:xfrm>
+        <a:prstGeom prst="rect">
+          <a:avLst/>
+        </a:prstGeom>
+        <a:solidFill>
+          <a:schemeClr val="accent1">
+            <a:alpha val="90000"/>
+            <a:tint val="40000"/>
+            <a:hueOff val="0"/>
+            <a:satOff val="0"/>
+            <a:lumOff val="0"/>
+            <a:alphaOff val="0"/>
+          </a:schemeClr>
+        </a:solidFill>
+        <a:ln w="25400" cap="flat" cmpd="sng" algn="ctr">
+          <a:solidFill>
+            <a:schemeClr val="accent1">
+              <a:alpha val="90000"/>
+              <a:tint val="40000"/>
+              <a:hueOff val="0"/>
+              <a:satOff val="0"/>
+              <a:lumOff val="0"/>
+              <a:alphaOff val="0"/>
+            </a:schemeClr>
+          </a:solidFill>
+          <a:prstDash val="solid"/>
+        </a:ln>
+        <a:effectLst/>
+      </dsp:spPr>
+      <dsp:style>
+        <a:lnRef idx="2">
+          <a:scrgbClr r="0" g="0" b="0"/>
+        </a:lnRef>
+        <a:fillRef idx="1">
+          <a:scrgbClr r="0" g="0" b="0"/>
+        </a:fillRef>
+        <a:effectRef idx="0">
+          <a:scrgbClr r="0" g="0" b="0"/>
+        </a:effectRef>
+        <a:fontRef idx="minor"/>
+      </dsp:style>
+      <dsp:txBody>
+        <a:bodyPr spcFirstLastPara="0" vert="horz" wrap="square" lIns="117348" tIns="117348" rIns="156464" bIns="176022" numCol="1" spcCol="1270" anchor="t" anchorCtr="0">
+          <a:noAutofit/>
+        </a:bodyPr>
+        <a:lstStyle/>
+        <a:p>
+          <a:pPr marL="228600" lvl="1" indent="-228600" algn="l" defTabSz="977900">
+            <a:lnSpc>
+              <a:spcPct val="90000"/>
+            </a:lnSpc>
+            <a:spcBef>
+              <a:spcPct val="0"/>
+            </a:spcBef>
+            <a:spcAft>
+              <a:spcPct val="15000"/>
+            </a:spcAft>
+            <a:buChar char="•"/>
+          </a:pPr>
+          <a:r>
+            <a:rPr lang="en-US" sz="2200" kern="1200" dirty="0"/>
+            <a:t>Bitcoin</a:t>
+          </a:r>
+        </a:p>
+        <a:p>
+          <a:pPr marL="228600" lvl="1" indent="-228600" algn="l" defTabSz="977900">
+            <a:lnSpc>
+              <a:spcPct val="90000"/>
+            </a:lnSpc>
+            <a:spcBef>
+              <a:spcPct val="0"/>
+            </a:spcBef>
+            <a:spcAft>
+              <a:spcPct val="15000"/>
+            </a:spcAft>
+            <a:buChar char="•"/>
+          </a:pPr>
+          <a:r>
+            <a:rPr lang="en-US" sz="2200" kern="1200" dirty="0"/>
+            <a:t>Money</a:t>
+          </a:r>
+        </a:p>
+        <a:p>
+          <a:pPr marL="228600" lvl="1" indent="-228600" algn="l" defTabSz="977900">
+            <a:lnSpc>
+              <a:spcPct val="90000"/>
+            </a:lnSpc>
+            <a:spcBef>
+              <a:spcPct val="0"/>
+            </a:spcBef>
+            <a:spcAft>
+              <a:spcPct val="15000"/>
+            </a:spcAft>
+            <a:buChar char="•"/>
+          </a:pPr>
+          <a:r>
+            <a:rPr lang="en-US" sz="2200" kern="1200" dirty="0"/>
+            <a:t>Mastercard</a:t>
+          </a:r>
+        </a:p>
+        <a:p>
+          <a:pPr marL="228600" lvl="1" indent="-228600" algn="l" defTabSz="977900">
+            <a:lnSpc>
+              <a:spcPct val="90000"/>
+            </a:lnSpc>
+            <a:spcBef>
+              <a:spcPct val="0"/>
+            </a:spcBef>
+            <a:spcAft>
+              <a:spcPct val="15000"/>
+            </a:spcAft>
+            <a:buChar char="•"/>
+          </a:pPr>
+          <a:r>
+            <a:rPr lang="en-US" sz="2200" kern="1200" dirty="0"/>
+            <a:t>A Messenger</a:t>
+          </a:r>
+        </a:p>
+        <a:p>
+          <a:pPr marL="228600" lvl="1" indent="-228600" algn="l" defTabSz="977900">
+            <a:lnSpc>
+              <a:spcPct val="90000"/>
+            </a:lnSpc>
+            <a:spcBef>
+              <a:spcPct val="0"/>
+            </a:spcBef>
+            <a:spcAft>
+              <a:spcPct val="15000"/>
+            </a:spcAft>
+            <a:buChar char="•"/>
+          </a:pPr>
+          <a:r>
+            <a:rPr lang="en-US" sz="2200" kern="1200" dirty="0"/>
+            <a:t>A Database</a:t>
+          </a:r>
+        </a:p>
+      </dsp:txBody>
+      <dsp:txXfrm>
+        <a:off x="2681217" y="684158"/>
+        <a:ext cx="2351923" cy="2060808"/>
+      </dsp:txXfrm>
+    </dsp:sp>
+  </dsp:spTree>
+</dsp:drawing>
+</file>
+
+<file path=ppt/diagrams/layout1.xml><?xml version="1.0" encoding="utf-8"?>
+<dgm:layoutDef xmlns:dgm="http://schemas.openxmlformats.org/drawingml/2006/diagram" xmlns:a="http://schemas.openxmlformats.org/drawingml/2006/main" uniqueId="urn:microsoft.com/office/officeart/2005/8/layout/hList1">
+  <dgm:title val=""/>
+  <dgm:desc val=""/>
+  <dgm:catLst>
+    <dgm:cat type="list" pri="5000"/>
+    <dgm:cat type="convert" pri="5000"/>
+  </dgm:catLst>
+  <dgm:sampData>
+    <dgm:dataModel>
+      <dgm:ptLst>
+        <dgm:pt modelId="0" type="doc"/>
+        <dgm:pt modelId="1">
+          <dgm:prSet phldr="1"/>
+        </dgm:pt>
+        <dgm:pt modelId="11">
+          <dgm:prSet phldr="1"/>
+        </dgm:pt>
+        <dgm:pt modelId="12">
+          <dgm:prSet phldr="1"/>
+        </dgm:pt>
+        <dgm:pt modelId="2">
+          <dgm:prSet phldr="1"/>
+        </dgm:pt>
+        <dgm:pt modelId="21">
+          <dgm:prSet phldr="1"/>
+        </dgm:pt>
+        <dgm:pt modelId="22">
+          <dgm:prSet phldr="1"/>
+        </dgm:pt>
+        <dgm:pt modelId="3">
+          <dgm:prSet phldr="1"/>
+        </dgm:pt>
+        <dgm:pt modelId="31">
+          <dgm:prSet phldr="1"/>
+        </dgm:pt>
+        <dgm:pt modelId="32">
+          <dgm:prSet phldr="1"/>
+        </dgm:pt>
+      </dgm:ptLst>
+      <dgm:cxnLst>
+        <dgm:cxn modelId="4" srcId="0" destId="1" srcOrd="0" destOrd="0"/>
+        <dgm:cxn modelId="5" srcId="0" destId="2" srcOrd="1" destOrd="0"/>
+        <dgm:cxn modelId="6" srcId="0" destId="3" srcOrd="2" destOrd="0"/>
+        <dgm:cxn modelId="13" srcId="1" destId="11" srcOrd="0" destOrd="0"/>
+        <dgm:cxn modelId="14" srcId="1" destId="12" srcOrd="1" destOrd="0"/>
+        <dgm:cxn modelId="23" srcId="2" destId="21" srcOrd="0" destOrd="0"/>
+        <dgm:cxn modelId="24" srcId="2" destId="22" srcOrd="1" destOrd="0"/>
+        <dgm:cxn modelId="33" srcId="3" destId="31" srcOrd="0" destOrd="0"/>
+        <dgm:cxn modelId="34" srcId="3" destId="32" srcOrd="1" destOrd="0"/>
+      </dgm:cxnLst>
+      <dgm:bg/>
+      <dgm:whole/>
+    </dgm:dataModel>
+  </dgm:sampData>
+  <dgm:styleData>
+    <dgm:dataModel>
+      <dgm:ptLst>
+        <dgm:pt modelId="0" type="doc"/>
+        <dgm:pt modelId="1">
+          <dgm:prSet phldr="1"/>
+        </dgm:pt>
+        <dgm:pt modelId="2">
+          <dgm:prSet phldr="1"/>
+        </dgm:pt>
+      </dgm:ptLst>
+      <dgm:cxnLst>
+        <dgm:cxn modelId="3" srcId="0" destId="1" srcOrd="0" destOrd="0"/>
+        <dgm:cxn modelId="4" srcId="0" destId="2" srcOrd="1" destOrd="0"/>
+      </dgm:cxnLst>
+      <dgm:bg/>
+      <dgm:whole/>
+    </dgm:dataModel>
+  </dgm:styleData>
+  <dgm:clrData>
+    <dgm:dataModel>
+      <dgm:ptLst>
+        <dgm:pt modelId="0" type="doc"/>
+        <dgm:pt modelId="1">
+          <dgm:prSet phldr="1"/>
+        </dgm:pt>
+        <dgm:pt modelId="2">
+          <dgm:prSet phldr="1"/>
+        </dgm:pt>
+        <dgm:pt modelId="3">
+          <dgm:prSet phldr="1"/>
+        </dgm:pt>
+        <dgm:pt modelId="4">
+          <dgm:prSet phldr="1"/>
+        </dgm:pt>
+      </dgm:ptLst>
+      <dgm:cxnLst>
+        <dgm:cxn modelId="5" srcId="0" destId="1" srcOrd="0" destOrd="0"/>
+        <dgm:cxn modelId="6" srcId="0" destId="2" srcOrd="1" destOrd="0"/>
+        <dgm:cxn modelId="7" srcId="0" destId="3" srcOrd="2" destOrd="0"/>
+        <dgm:cxn modelId="8" srcId="0" destId="4" srcOrd="3" destOrd="0"/>
+      </dgm:cxnLst>
+      <dgm:bg/>
+      <dgm:whole/>
+    </dgm:dataModel>
+  </dgm:clrData>
+  <dgm:layoutNode name="Name0">
+    <dgm:varLst>
+      <dgm:dir/>
+      <dgm:animLvl val="lvl"/>
+      <dgm:resizeHandles val="exact"/>
+    </dgm:varLst>
+    <dgm:choose name="Name1">
+      <dgm:if name="Name2" func="var" arg="dir" op="equ" val="norm">
+        <dgm:alg type="lin"/>
+      </dgm:if>
+      <dgm:else name="Name3">
+        <dgm:alg type="lin">
+          <dgm:param type="linDir" val="fromR"/>
+        </dgm:alg>
+      </dgm:else>
+    </dgm:choose>
+    <dgm:shape xmlns:r="http://schemas.openxmlformats.org/officeDocument/2006/relationships" r:blip="">
+      <dgm:adjLst/>
+    </dgm:shape>
+    <dgm:presOf/>
+    <dgm:constrLst>
+      <dgm:constr type="h" for="ch" forName="composite" refType="h"/>
+      <dgm:constr type="w" for="ch" forName="composite" refType="w"/>
+      <dgm:constr type="w" for="des" forName="parTx"/>
+      <dgm:constr type="h" for="des" forName="parTx" op="equ"/>
+      <dgm:constr type="w" for="des" forName="desTx"/>
+      <dgm:constr type="h" for="des" forName="desTx" op="equ"/>
+      <dgm:constr type="primFontSz" for="des" forName="parTx" val="65"/>
+      <dgm:constr type="secFontSz" for="des" forName="desTx" refType="primFontSz" refFor="des" refForName="parTx" op="equ"/>
+      <dgm:constr type="h" for="des" forName="parTx" refType="primFontSz" refFor="des" refForName="parTx" fact="0.8"/>
+      <dgm:constr type="h" for="des" forName="desTx" refType="primFontSz" refFor="des" refForName="parTx" fact="1.22"/>
+      <dgm:constr type="w" for="ch" forName="space" refType="w" refFor="ch" refForName="composite" op="equ" fact="0.14"/>
+    </dgm:constrLst>
+    <dgm:ruleLst>
+      <dgm:rule type="w" for="ch" forName="composite" val="0" fact="NaN" max="NaN"/>
+      <dgm:rule type="primFontSz" for="des" forName="parTx" val="5" fact="NaN" max="NaN"/>
+    </dgm:ruleLst>
+    <dgm:forEach name="Name4" axis="ch" ptType="node">
+      <dgm:layoutNode name="composite">
+        <dgm:alg type="composite"/>
+        <dgm:shape xmlns:r="http://schemas.openxmlformats.org/officeDocument/2006/relationships" r:blip="">
+          <dgm:adjLst/>
+        </dgm:shape>
+        <dgm:presOf/>
+        <dgm:constrLst>
+          <dgm:constr type="l" for="ch" forName="parTx"/>
+          <dgm:constr type="w" for="ch" forName="parTx" refType="w"/>
+          <dgm:constr type="t" for="ch" forName="parTx"/>
+          <dgm:constr type="l" for="ch" forName="desTx"/>
+          <dgm:constr type="w" for="ch" forName="desTx" refType="w" refFor="ch" refForName="parTx"/>
+          <dgm:constr type="t" for="ch" forName="desTx" refType="h" refFor="ch" refForName="parTx"/>
+        </dgm:constrLst>
+        <dgm:ruleLst>
+          <dgm:rule type="h" val="INF" fact="NaN" max="NaN"/>
+        </dgm:ruleLst>
+        <dgm:layoutNode name="parTx" styleLbl="alignNode1">
+          <dgm:varLst>
+            <dgm:chMax val="0"/>
+            <dgm:chPref val="0"/>
+            <dgm:bulletEnabled val="1"/>
+          </dgm:varLst>
+          <dgm:alg type="tx"/>
+          <dgm:shape xmlns:r="http://schemas.openxmlformats.org/officeDocument/2006/relationships" type="rect" r:blip="">
+            <dgm:adjLst/>
+          </dgm:shape>
+          <dgm:presOf axis="self" ptType="node"/>
+          <dgm:constrLst>
+            <dgm:constr type="h" refType="w" op="lte" fact="0.4"/>
+            <dgm:constr type="h"/>
+            <dgm:constr type="tMarg" refType="primFontSz" fact="0.32"/>
+            <dgm:constr type="bMarg" refType="primFontSz" fact="0.32"/>
+          </dgm:constrLst>
+          <dgm:ruleLst>
+            <dgm:rule type="h" val="INF" fact="NaN" max="NaN"/>
+          </dgm:ruleLst>
+        </dgm:layoutNode>
+        <dgm:layoutNode name="desTx" styleLbl="alignAccFollowNode1">
+          <dgm:varLst>
+            <dgm:bulletEnabled val="1"/>
+          </dgm:varLst>
+          <dgm:alg type="tx">
+            <dgm:param type="stBulletLvl" val="1"/>
+          </dgm:alg>
+          <dgm:shape xmlns:r="http://schemas.openxmlformats.org/officeDocument/2006/relationships" type="rect" r:blip="">
+            <dgm:adjLst/>
+          </dgm:shape>
+          <dgm:presOf axis="des" ptType="node"/>
+          <dgm:constrLst>
+            <dgm:constr type="secFontSz" val="65"/>
+            <dgm:constr type="primFontSz" refType="secFontSz"/>
+            <dgm:constr type="h"/>
+            <dgm:constr type="lMarg" refType="primFontSz" fact="0.42"/>
+            <dgm:constr type="tMarg" refType="primFontSz" fact="0.42"/>
+            <dgm:constr type="bMarg" refType="primFontSz" fact="0.63"/>
+          </dgm:constrLst>
+          <dgm:ruleLst>
+            <dgm:rule type="h" val="INF" fact="NaN" max="NaN"/>
+          </dgm:ruleLst>
+        </dgm:layoutNode>
+      </dgm:layoutNode>
+      <dgm:forEach name="Name5" axis="followSib" ptType="sibTrans" cnt="1">
+        <dgm:layoutNode name="space">
+          <dgm:alg type="sp"/>
+          <dgm:shape xmlns:r="http://schemas.openxmlformats.org/officeDocument/2006/relationships" r:blip="">
+            <dgm:adjLst/>
+          </dgm:shape>
+          <dgm:presOf/>
+          <dgm:constrLst/>
+          <dgm:ruleLst/>
+        </dgm:layoutNode>
+      </dgm:forEach>
+    </dgm:forEach>
+  </dgm:layoutNode>
+</dgm:layoutDef>
+</file>
+
+<file path=ppt/diagrams/quickStyle1.xml><?xml version="1.0" encoding="utf-8"?>
+<dgm:styleDef xmlns:dgm="http://schemas.openxmlformats.org/drawingml/2006/diagram" xmlns:a="http://schemas.openxmlformats.org/drawingml/2006/main" uniqueId="urn:microsoft.com/office/officeart/2005/8/quickstyle/simple1">
+  <dgm:title val=""/>
+  <dgm:desc val=""/>
+  <dgm:catLst>
+    <dgm:cat type="simple" pri="10100"/>
+  </dgm:catLst>
+  <dgm:scene3d>
+    <a:camera prst="orthographicFront"/>
+    <a:lightRig rig="threePt" dir="t"/>
+  </dgm:scene3d>
+  <dgm:styleLbl name="node0">
+    <dgm:scene3d>
+      <a:camera prst="orthographicFront"/>
+      <a:lightRig rig="threePt" dir="t"/>
+    </dgm:scene3d>
+    <dgm:sp3d/>
+    <dgm:txPr/>
+    <dgm:style>
+      <a:lnRef idx="2">
+        <a:scrgbClr r="0" g="0" b="0"/>
+      </a:lnRef>
+      <a:fillRef idx="1">
+        <a:scrgbClr r="0" g="0" b="0"/>
+      </a:fillRef>
+      <a:effectRef idx="0">
+        <a:scrgbClr r="0" g="0" b="0"/>
+      </a:effectRef>
+      <a:fontRef idx="minor">
+        <a:schemeClr val="lt1"/>
+      </a:fontRef>
+    </dgm:style>
+  </dgm:styleLbl>
+  <dgm:styleLbl name="lnNode1">
+    <dgm:scene3d>
+      <a:camera prst="orthographicFront"/>
+      <a:lightRig rig="threePt" dir="t"/>
+    </dgm:scene3d>
+    <dgm:sp3d/>
+    <dgm:txPr/>
+    <dgm:style>
+      <a:lnRef idx="2">
+        <a:scrgbClr r="0" g="0" b="0"/>
+      </a:lnRef>
+      <a:fillRef idx="1">
+        <a:scrgbClr r="0" g="0" b="0"/>
+      </a:fillRef>
+      <a:effectRef idx="0">
+        <a:scrgbClr r="0" g="0" b="0"/>
+      </a:effectRef>
+      <a:fontRef idx="minor">
+        <a:schemeClr val="lt1"/>
+      </a:fontRef>
+    </dgm:style>
+  </dgm:styleLbl>
+  <dgm:styleLbl name="vennNode1">
+    <dgm:scene3d>
+      <a:camera prst="orthographicFront"/>
+      <a:lightRig rig="threePt" dir="t"/>
+    </dgm:scene3d>
+    <dgm:sp3d/>
+    <dgm:txPr/>
+    <dgm:style>
+      <a:lnRef idx="2">
+        <a:scrgbClr r="0" g="0" b="0"/>
+      </a:lnRef>
+      <a:fillRef idx="1">
+        <a:scrgbClr r="0" g="0" b="0"/>
+      </a:fillRef>
+      <a:effectRef idx="0">
+        <a:scrgbClr r="0" g="0" b="0"/>
+      </a:effectRef>
+      <a:fontRef idx="minor">
+        <a:schemeClr val="tx1"/>
+      </a:fontRef>
+    </dgm:style>
+  </dgm:styleLbl>
+  <dgm:styleLbl name="alignNode1">
+    <dgm:scene3d>
+      <a:camera prst="orthographicFront"/>
+      <a:lightRig rig="threePt" dir="t"/>
+    </dgm:scene3d>
+    <dgm:sp3d/>
+    <dgm:txPr/>
+    <dgm:style>
+      <a:lnRef idx="2">
+        <a:scrgbClr r="0" g="0" b="0"/>
+      </a:lnRef>
+      <a:fillRef idx="1">
+        <a:scrgbClr r="0" g="0" b="0"/>
+      </a:fillRef>
+      <a:effectRef idx="0">
+        <a:scrgbClr r="0" g="0" b="0"/>
+      </a:effectRef>
+      <a:fontRef idx="minor">
+        <a:schemeClr val="lt1"/>
+      </a:fontRef>
+    </dgm:style>
+  </dgm:styleLbl>
+  <dgm:styleLbl name="node1">
+    <dgm:scene3d>
+      <a:camera prst="orthographicFront"/>
+      <a:lightRig rig="threePt" dir="t"/>
+    </dgm:scene3d>
+    <dgm:sp3d/>
+    <dgm:txPr/>
+    <dgm:style>
+      <a:lnRef idx="2">
+        <a:scrgbClr r="0" g="0" b="0"/>
+      </a:lnRef>
+      <a:fillRef idx="1">
+        <a:scrgbClr r="0" g="0" b="0"/>
+      </a:fillRef>
+      <a:effectRef idx="0">
+        <a:scrgbClr r="0" g="0" b="0"/>
+      </a:effectRef>
+      <a:fontRef idx="minor">
+        <a:schemeClr val="lt1"/>
+      </a:fontRef>
+    </dgm:style>
+  </dgm:styleLbl>
+  <dgm:styleLbl name="node2">
+    <dgm:scene3d>
+      <a:camera prst="orthographicFront"/>
+      <a:lightRig rig="threePt" dir="t"/>
+    </dgm:scene3d>
+    <dgm:sp3d/>
+    <dgm:txPr/>
+    <dgm:style>
+      <a:lnRef idx="2">
+        <a:scrgbClr r="0" g="0" b="0"/>
+      </a:lnRef>
+      <a:fillRef idx="1">
+        <a:scrgbClr r="0" g="0" b="0"/>
+      </a:fillRef>
+      <a:effectRef idx="0">
+        <a:scrgbClr r="0" g="0" b="0"/>
+      </a:effectRef>
+      <a:fontRef idx="minor">
+        <a:schemeClr val="lt1"/>
+      </a:fontRef>
+    </dgm:style>
+  </dgm:styleLbl>
+  <dgm:styleLbl name="node3">
+    <dgm:scene3d>
+      <a:camera prst="orthographicFront"/>
+      <a:lightRig rig="threePt" dir="t"/>
+    </dgm:scene3d>
+    <dgm:sp3d/>
+    <dgm:txPr/>
+    <dgm:style>
+      <a:lnRef idx="2">
+        <a:scrgbClr r="0" g="0" b="0"/>
+      </a:lnRef>
+      <a:fillRef idx="1">
+        <a:scrgbClr r="0" g="0" b="0"/>
+      </a:fillRef>
+      <a:effectRef idx="0">
+        <a:scrgbClr r="0" g="0" b="0"/>
+      </a:effectRef>
+      <a:fontRef idx="minor">
+        <a:schemeClr val="lt1"/>
+      </a:fontRef>
+    </dgm:style>
+  </dgm:styleLbl>
+  <dgm:styleLbl name="node4">
+    <dgm:scene3d>
+      <a:camera prst="orthographicFront"/>
+      <a:lightRig rig="threePt" dir="t"/>
+    </dgm:scene3d>
+    <dgm:sp3d/>
+    <dgm:txPr/>
+    <dgm:style>
+      <a:lnRef idx="2">
+        <a:scrgbClr r="0" g="0" b="0"/>
+      </a:lnRef>
+      <a:fillRef idx="1">
+        <a:scrgbClr r="0" g="0" b="0"/>
+      </a:fillRef>
+      <a:effectRef idx="0">
+        <a:scrgbClr r="0" g="0" b="0"/>
+      </a:effectRef>
+      <a:fontRef idx="minor">
+        <a:schemeClr val="lt1"/>
+      </a:fontRef>
+    </dgm:style>
+  </dgm:styleLbl>
+  <dgm:styleLbl name="fgImgPlace1">
+    <dgm:scene3d>
+      <a:camera prst="orthographicFront"/>
+      <a:lightRig rig="threePt" dir="t"/>
+    </dgm:scene3d>
+    <dgm:sp3d/>
+    <dgm:txPr/>
+    <dgm:style>
+      <a:lnRef idx="2">
+        <a:scrgbClr r="0" g="0" b="0"/>
+      </a:lnRef>
+      <a:fillRef idx="1">
+        <a:scrgbClr r="0" g="0" b="0"/>
+      </a:fillRef>
+      <a:effectRef idx="0">
+        <a:scrgbClr r="0" g="0" b="0"/>
+      </a:effectRef>
+      <a:fontRef idx="minor"/>
+    </dgm:style>
+  </dgm:styleLbl>
+  <dgm:styleLbl name="alignImgPlace1">
+    <dgm:scene3d>
+      <a:camera prst="orthographicFront"/>
+      <a:lightRig rig="threePt" dir="t"/>
+    </dgm:scene3d>
+    <dgm:sp3d/>
+    <dgm:txPr/>
+    <dgm:style>
+      <a:lnRef idx="2">
+        <a:scrgbClr r="0" g="0" b="0"/>
+      </a:lnRef>
+      <a:fillRef idx="1">
+        <a:scrgbClr r="0" g="0" b="0"/>
+      </a:fillRef>
+      <a:effectRef idx="0">
+        <a:scrgbClr r="0" g="0" b="0"/>
+      </a:effectRef>
+      <a:fontRef idx="minor"/>
+    </dgm:style>
+  </dgm:styleLbl>
+  <dgm:styleLbl name="bgImgPlace1">
+    <dgm:scene3d>
+      <a:camera prst="orthographicFront"/>
+      <a:lightRig rig="threePt" dir="t"/>
+    </dgm:scene3d>
+    <dgm:sp3d/>
+    <dgm:txPr/>
+    <dgm:style>
+      <a:lnRef idx="2">
+        <a:scrgbClr r="0" g="0" b="0"/>
+      </a:lnRef>
+      <a:fillRef idx="1">
+        <a:scrgbClr r="0" g="0" b="0"/>
+      </a:fillRef>
+      <a:effectRef idx="0">
+        <a:scrgbClr r="0" g="0" b="0"/>
+      </a:effectRef>
+      <a:fontRef idx="minor"/>
+    </dgm:style>
+  </dgm:styleLbl>
+  <dgm:styleLbl name="sibTrans2D1">
+    <dgm:scene3d>
+      <a:camera prst="orthographicFront"/>
+      <a:lightRig rig="threePt" dir="t"/>
+    </dgm:scene3d>
+    <dgm:sp3d/>
+    <dgm:txPr/>
+    <dgm:style>
+      <a:lnRef idx="0">
+        <a:scrgbClr r="0" g="0" b="0"/>
+      </a:lnRef>
+      <a:fillRef idx="1">
+        <a:scrgbClr r="0" g="0" b="0"/>
+      </a:fillRef>
+      <a:effectRef idx="0">
+        <a:scrgbClr r="0" g="0" b="0"/>
+      </a:effectRef>
+      <a:fontRef idx="minor">
+        <a:schemeClr val="lt1"/>
+      </a:fontRef>
+    </dgm:style>
+  </dgm:styleLbl>
+  <dgm:styleLbl name="fgSibTrans2D1">
+    <dgm:scene3d>
+      <a:camera prst="orthographicFront"/>
+      <a:lightRig rig="threePt" dir="t"/>
+    </dgm:scene3d>
+    <dgm:sp3d/>
+    <dgm:txPr/>
+    <dgm:style>
+      <a:lnRef idx="0">
+        <a:scrgbClr r="0" g="0" b="0"/>
+      </a:lnRef>
+      <a:fillRef idx="1">
+        <a:scrgbClr r="0" g="0" b="0"/>
+      </a:fillRef>
+      <a:effectRef idx="0">
+        <a:scrgbClr r="0" g="0" b="0"/>
+      </a:effectRef>
+      <a:fontRef idx="minor">
+        <a:schemeClr val="lt1"/>
+      </a:fontRef>
+    </dgm:style>
+  </dgm:styleLbl>
+  <dgm:styleLbl name="bgSibTrans2D1">
+    <dgm:scene3d>
+      <a:camera prst="orthographicFront"/>
+      <a:lightRig rig="threePt" dir="t"/>
+    </dgm:scene3d>
+    <dgm:sp3d/>
+    <dgm:txPr/>
+    <dgm:style>
+      <a:lnRef idx="0">
+        <a:scrgbClr r="0" g="0" b="0"/>
+      </a:lnRef>
+      <a:fillRef idx="1">
+        <a:scrgbClr r="0" g="0" b="0"/>
+      </a:fillRef>
+      <a:effectRef idx="0">
+        <a:scrgbClr r="0" g="0" b="0"/>
+      </a:effectRef>
+      <a:fontRef idx="minor">
+        <a:schemeClr val="lt1"/>
+      </a:fontRef>
+    </dgm:style>
+  </dgm:styleLbl>
+  <dgm:styleLbl name="sibTrans1D1">
+    <dgm:scene3d>
+      <a:camera prst="orthographicFront"/>
+      <a:lightRig rig="threePt" dir="t"/>
+    </dgm:scene3d>
+    <dgm:sp3d/>
+    <dgm:txPr/>
+    <dgm:style>
+      <a:lnRef idx="1">
+        <a:scrgbClr r="0" g="0" b="0"/>
+      </a:lnRef>
+      <a:fillRef idx="0">
+        <a:scrgbClr r="0" g="0" b="0"/>
+      </a:fillRef>
+      <a:effectRef idx="0">
+        <a:scrgbClr r="0" g="0" b="0"/>
+      </a:effectRef>
+      <a:fontRef idx="minor"/>
+    </dgm:style>
+  </dgm:styleLbl>
+  <dgm:styleLbl name="callout">
+    <dgm:scene3d>
+      <a:camera prst="orthographicFront"/>
+      <a:lightRig rig="threePt" dir="t"/>
+    </dgm:scene3d>
+    <dgm:sp3d/>
+    <dgm:txPr/>
+    <dgm:style>
+      <a:lnRef idx="2">
+        <a:scrgbClr r="0" g="0" b="0"/>
+      </a:lnRef>
+      <a:fillRef idx="1">
+        <a:scrgbClr r="0" g="0" b="0"/>
+      </a:fillRef>
+      <a:effectRef idx="0">
+        <a:scrgbClr r="0" g="0" b="0"/>
+      </a:effectRef>
+      <a:fontRef idx="minor"/>
+    </dgm:style>
+  </dgm:styleLbl>
+  <dgm:styleLbl name="asst0">
+    <dgm:scene3d>
+      <a:camera prst="orthographicFront"/>
+      <a:lightRig rig="threePt" dir="t"/>
+    </dgm:scene3d>
+    <dgm:sp3d/>
+    <dgm:txPr/>
+    <dgm:style>
+      <a:lnRef idx="2">
+        <a:scrgbClr r="0" g="0" b="0"/>
+      </a:lnRef>
+      <a:fillRef idx="1">
+        <a:scrgbClr r="0" g="0" b="0"/>
+      </a:fillRef>
+      <a:effectRef idx="0">
+        <a:scrgbClr r="0" g="0" b="0"/>
+      </a:effectRef>
+      <a:fontRef idx="minor">
+        <a:schemeClr val="lt1"/>
+      </a:fontRef>
+    </dgm:style>
+  </dgm:styleLbl>
+  <dgm:styleLbl name="asst1">
+    <dgm:scene3d>
+      <a:camera prst="orthographicFront"/>
+      <a:lightRig rig="threePt" dir="t"/>
+    </dgm:scene3d>
+    <dgm:sp3d/>
+    <dgm:txPr/>
+    <dgm:style>
+      <a:lnRef idx="2">
+        <a:scrgbClr r="0" g="0" b="0"/>
+      </a:lnRef>
+      <a:fillRef idx="1">
+        <a:scrgbClr r="0" g="0" b="0"/>
+      </a:fillRef>
+      <a:effectRef idx="0">
+        <a:scrgbClr r="0" g="0" b="0"/>
+      </a:effectRef>
+      <a:fontRef idx="minor">
+        <a:schemeClr val="lt1"/>
+      </a:fontRef>
+    </dgm:style>
+  </dgm:styleLbl>
+  <dgm:styleLbl name="asst2">
+    <dgm:scene3d>
+      <a:camera prst="orthographicFront"/>
+      <a:lightRig rig="threePt" dir="t"/>
+    </dgm:scene3d>
+    <dgm:sp3d/>
+    <dgm:txPr/>
+    <dgm:style>
+      <a:lnRef idx="2">
+        <a:scrgbClr r="0" g="0" b="0"/>
+      </a:lnRef>
+      <a:fillRef idx="1">
+        <a:scrgbClr r="0" g="0" b="0"/>
+      </a:fillRef>
+      <a:effectRef idx="0">
+        <a:scrgbClr r="0" g="0" b="0"/>
+      </a:effectRef>
+      <a:fontRef idx="minor">
+        <a:schemeClr val="lt1"/>
+      </a:fontRef>
+    </dgm:style>
+  </dgm:styleLbl>
+  <dgm:styleLbl name="asst3">
+    <dgm:scene3d>
+      <a:camera prst="orthographicFront"/>
+      <a:lightRig rig="threePt" dir="t"/>
+    </dgm:scene3d>
+    <dgm:sp3d/>
+    <dgm:txPr/>
+    <dgm:style>
+      <a:lnRef idx="2">
+        <a:scrgbClr r="0" g="0" b="0"/>
+      </a:lnRef>
+      <a:fillRef idx="1">
+        <a:scrgbClr r="0" g="0" b="0"/>
+      </a:fillRef>
+      <a:effectRef idx="0">
+        <a:scrgbClr r="0" g="0" b="0"/>
+      </a:effectRef>
+      <a:fontRef idx="minor">
+        <a:schemeClr val="lt1"/>
+      </a:fontRef>
+    </dgm:style>
+  </dgm:styleLbl>
+  <dgm:styleLbl name="asst4">
+    <dgm:scene3d>
+      <a:camera prst="orthographicFront"/>
+      <a:lightRig rig="threePt" dir="t"/>
+    </dgm:scene3d>
+    <dgm:sp3d/>
+    <dgm:txPr/>
+    <dgm:style>
+      <a:lnRef idx="2">
+        <a:scrgbClr r="0" g="0" b="0"/>
+      </a:lnRef>
+      <a:fillRef idx="1">
+        <a:scrgbClr r="0" g="0" b="0"/>
+      </a:fillRef>
+      <a:effectRef idx="0">
+        <a:scrgbClr r="0" g="0" b="0"/>
+      </a:effectRef>
+      <a:fontRef idx="minor">
+        <a:schemeClr val="lt1"/>
+      </a:fontRef>
+    </dgm:style>
+  </dgm:styleLbl>
+  <dgm:styleLbl name="parChTrans2D1">
+    <dgm:scene3d>
+      <a:camera prst="orthographicFront"/>
+      <a:lightRig rig="threePt" dir="t"/>
+    </dgm:scene3d>
+    <dgm:sp3d/>
+    <dgm:txPr/>
+    <dgm:style>
+      <a:lnRef idx="2">
+        <a:scrgbClr r="0" g="0" b="0"/>
+      </a:lnRef>
+      <a:fillRef idx="1">
+        <a:scrgbClr r="0" g="0" b="0"/>
+      </a:fillRef>
+      <a:effectRef idx="0">
+        <a:scrgbClr r="0" g="0" b="0"/>
+      </a:effectRef>
+      <a:fontRef idx="minor">
+        <a:schemeClr val="lt1"/>
+      </a:fontRef>
+    </dgm:style>
+  </dgm:styleLbl>
+  <dgm:styleLbl name="parChTrans2D2">
+    <dgm:scene3d>
+      <a:camera prst="orthographicFront"/>
+      <a:lightRig rig="threePt" dir="t"/>
+    </dgm:scene3d>
+    <dgm:sp3d/>
+    <dgm:txPr/>
+    <dgm:style>
+      <a:lnRef idx="2">
+        <a:scrgbClr r="0" g="0" b="0"/>
+      </a:lnRef>
+      <a:fillRef idx="1">
+        <a:scrgbClr r="0" g="0" b="0"/>
+      </a:fillRef>
+      <a:effectRef idx="0">
+        <a:scrgbClr r="0" g="0" b="0"/>
+      </a:effectRef>
+      <a:fontRef idx="minor">
+        <a:schemeClr val="lt1"/>
+      </a:fontRef>
+    </dgm:style>
+  </dgm:styleLbl>
+  <dgm:styleLbl name="parChTrans2D3">
+    <dgm:scene3d>
+      <a:camera prst="orthographicFront"/>
+      <a:lightRig rig="threePt" dir="t"/>
+    </dgm:scene3d>
+    <dgm:sp3d/>
+    <dgm:txPr/>
+    <dgm:style>
+      <a:lnRef idx="2">
+        <a:scrgbClr r="0" g="0" b="0"/>
+      </a:lnRef>
+      <a:fillRef idx="1">
+        <a:scrgbClr r="0" g="0" b="0"/>
+      </a:fillRef>
+      <a:effectRef idx="0">
+        <a:scrgbClr r="0" g="0" b="0"/>
+      </a:effectRef>
+      <a:fontRef idx="minor">
+        <a:schemeClr val="lt1"/>
+      </a:fontRef>
+    </dgm:style>
+  </dgm:styleLbl>
+  <dgm:styleLbl name="parChTrans2D4">
+    <dgm:scene3d>
+      <a:camera prst="orthographicFront"/>
+      <a:lightRig rig="threePt" dir="t"/>
+    </dgm:scene3d>
+    <dgm:sp3d/>
+    <dgm:txPr/>
+    <dgm:style>
+      <a:lnRef idx="2">
+        <a:scrgbClr r="0" g="0" b="0"/>
+      </a:lnRef>
+      <a:fillRef idx="1">
+        <a:scrgbClr r="0" g="0" b="0"/>
+      </a:fillRef>
+      <a:effectRef idx="0">
+        <a:scrgbClr r="0" g="0" b="0"/>
+      </a:effectRef>
+      <a:fontRef idx="minor">
+        <a:schemeClr val="lt1"/>
+      </a:fontRef>
+    </dgm:style>
+  </dgm:styleLbl>
+  <dgm:styleLbl name="parChTrans1D1">
+    <dgm:scene3d>
+      <a:camera prst="orthographicFront"/>
+      <a:lightRig rig="threePt" dir="t"/>
+    </dgm:scene3d>
+    <dgm:sp3d/>
+    <dgm:txPr/>
+    <dgm:style>
+      <a:lnRef idx="2">
+        <a:scrgbClr r="0" g="0" b="0"/>
+      </a:lnRef>
+      <a:fillRef idx="0">
+        <a:scrgbClr r="0" g="0" b="0"/>
+      </a:fillRef>
+      <a:effectRef idx="0">
+        <a:scrgbClr r="0" g="0" b="0"/>
+      </a:effectRef>
+      <a:fontRef idx="minor"/>
+    </dgm:style>
+  </dgm:styleLbl>
+  <dgm:styleLbl name="parChTrans1D2">
+    <dgm:scene3d>
+      <a:camera prst="orthographicFront"/>
+      <a:lightRig rig="threePt" dir="t"/>
+    </dgm:scene3d>
+    <dgm:sp3d/>
+    <dgm:txPr/>
+    <dgm:style>
+      <a:lnRef idx="2">
+        <a:scrgbClr r="0" g="0" b="0"/>
+      </a:lnRef>
+      <a:fillRef idx="0">
+        <a:scrgbClr r="0" g="0" b="0"/>
+      </a:fillRef>
+      <a:effectRef idx="0">
+        <a:scrgbClr r="0" g="0" b="0"/>
+      </a:effectRef>
+      <a:fontRef idx="minor"/>
+    </dgm:style>
+  </dgm:styleLbl>
+  <dgm:styleLbl name="parChTrans1D3">
+    <dgm:scene3d>
+      <a:camera prst="orthographicFront"/>
+      <a:lightRig rig="threePt" dir="t"/>
+    </dgm:scene3d>
+    <dgm:sp3d/>
+    <dgm:txPr/>
+    <dgm:style>
+      <a:lnRef idx="2">
+        <a:scrgbClr r="0" g="0" b="0"/>
+      </a:lnRef>
+      <a:fillRef idx="0">
+        <a:scrgbClr r="0" g="0" b="0"/>
+      </a:fillRef>
+      <a:effectRef idx="0">
+        <a:scrgbClr r="0" g="0" b="0"/>
+      </a:effectRef>
+      <a:fontRef idx="minor"/>
+    </dgm:style>
+  </dgm:styleLbl>
+  <dgm:styleLbl name="parChTrans1D4">
+    <dgm:scene3d>
+      <a:camera prst="orthographicFront"/>
+      <a:lightRig rig="threePt" dir="t"/>
+    </dgm:scene3d>
+    <dgm:sp3d/>
+    <dgm:txPr/>
+    <dgm:style>
+      <a:lnRef idx="2">
+        <a:scrgbClr r="0" g="0" b="0"/>
+      </a:lnRef>
+      <a:fillRef idx="0">
+        <a:scrgbClr r="0" g="0" b="0"/>
+      </a:fillRef>
+      <a:effectRef idx="0">
+        <a:scrgbClr r="0" g="0" b="0"/>
+      </a:effectRef>
+      <a:fontRef idx="minor"/>
+    </dgm:style>
+  </dgm:styleLbl>
+  <dgm:styleLbl name="fgAcc1">
+    <dgm:scene3d>
+      <a:camera prst="orthographicFront"/>
+      <a:lightRig rig="threePt" dir="t"/>
+    </dgm:scene3d>
+    <dgm:sp3d/>
+    <dgm:txPr/>
+    <dgm:style>
+      <a:lnRef idx="2">
+        <a:scrgbClr r="0" g="0" b="0"/>
+      </a:lnRef>
+      <a:fillRef idx="1">
+        <a:scrgbClr r="0" g="0" b="0"/>
+      </a:fillRef>
+      <a:effectRef idx="0">
+        <a:scrgbClr r="0" g="0" b="0"/>
+      </a:effectRef>
+      <a:fontRef idx="minor"/>
+    </dgm:style>
+  </dgm:styleLbl>
+  <dgm:styleLbl name="conFgAcc1">
+    <dgm:scene3d>
+      <a:camera prst="orthographicFront"/>
+      <a:lightRig rig="threePt" dir="t"/>
+    </dgm:scene3d>
+    <dgm:sp3d/>
+    <dgm:txPr/>
+    <dgm:style>
+      <a:lnRef idx="2">
+        <a:scrgbClr r="0" g="0" b="0"/>
+      </a:lnRef>
+      <a:fillRef idx="1">
+        <a:scrgbClr r="0" g="0" b="0"/>
+      </a:fillRef>
+      <a:effectRef idx="0">
+        <a:scrgbClr r="0" g="0" b="0"/>
+      </a:effectRef>
+      <a:fontRef idx="minor"/>
+    </dgm:style>
+  </dgm:styleLbl>
+  <dgm:styleLbl name="alignAcc1">
+    <dgm:scene3d>
+      <a:camera prst="orthographicFront"/>
+      <a:lightRig rig="threePt" dir="t"/>
+    </dgm:scene3d>
+    <dgm:sp3d/>
+    <dgm:txPr/>
+    <dgm:style>
+      <a:lnRef idx="2">
+        <a:scrgbClr r="0" g="0" b="0"/>
+      </a:lnRef>
+      <a:fillRef idx="1">
+        <a:scrgbClr r="0" g="0" b="0"/>
+      </a:fillRef>
+      <a:effectRef idx="0">
+        <a:scrgbClr r="0" g="0" b="0"/>
+      </a:effectRef>
+      <a:fontRef idx="minor"/>
+    </dgm:style>
+  </dgm:styleLbl>
+  <dgm:styleLbl name="trAlignAcc1">
+    <dgm:scene3d>
+      <a:camera prst="orthographicFront"/>
+      <a:lightRig rig="threePt" dir="t"/>
+    </dgm:scene3d>
+    <dgm:sp3d/>
+    <dgm:txPr/>
+    <dgm:style>
+      <a:lnRef idx="1">
+        <a:scrgbClr r="0" g="0" b="0"/>
+      </a:lnRef>
+      <a:fillRef idx="1">
+        <a:scrgbClr r="0" g="0" b="0"/>
+      </a:fillRef>
+      <a:effectRef idx="0">
+        <a:scrgbClr r="0" g="0" b="0"/>
+      </a:effectRef>
+      <a:fontRef idx="minor"/>
+    </dgm:style>
+  </dgm:styleLbl>
+  <dgm:styleLbl name="bgAcc1">
+    <dgm:scene3d>
+      <a:camera prst="orthographicFront"/>
+      <a:lightRig rig="threePt" dir="t"/>
+    </dgm:scene3d>
+    <dgm:sp3d/>
+    <dgm:txPr/>
+    <dgm:style>
+      <a:lnRef idx="2">
+        <a:scrgbClr r="0" g="0" b="0"/>
+      </a:lnRef>
+      <a:fillRef idx="1">
+        <a:scrgbClr r="0" g="0" b="0"/>
+      </a:fillRef>
+      <a:effectRef idx="0">
+        <a:scrgbClr r="0" g="0" b="0"/>
+      </a:effectRef>
+      <a:fontRef idx="minor"/>
+    </dgm:style>
+  </dgm:styleLbl>
+  <dgm:styleLbl name="solidFgAcc1">
+    <dgm:scene3d>
+      <a:camera prst="orthographicFront"/>
+      <a:lightRig rig="threePt" dir="t"/>
+    </dgm:scene3d>
+    <dgm:sp3d/>
+    <dgm:txPr/>
+    <dgm:style>
+      <a:lnRef idx="2">
+        <a:scrgbClr r="0" g="0" b="0"/>
+      </a:lnRef>
+      <a:fillRef idx="1">
+        <a:scrgbClr r="0" g="0" b="0"/>
+      </a:fillRef>
+      <a:effectRef idx="0">
+        <a:scrgbClr r="0" g="0" b="0"/>
+      </a:effectRef>
+      <a:fontRef idx="minor"/>
+    </dgm:style>
+  </dgm:styleLbl>
+  <dgm:styleLbl name="solidAlignAcc1">
+    <dgm:scene3d>
+      <a:camera prst="orthographicFront"/>
+      <a:lightRig rig="threePt" dir="t"/>
+    </dgm:scene3d>
+    <dgm:sp3d/>
+    <dgm:txPr/>
+    <dgm:style>
+      <a:lnRef idx="2">
+        <a:scrgbClr r="0" g="0" b="0"/>
+      </a:lnRef>
+      <a:fillRef idx="1">
+        <a:scrgbClr r="0" g="0" b="0"/>
+      </a:fillRef>
+      <a:effectRef idx="0">
+        <a:scrgbClr r="0" g="0" b="0"/>
+      </a:effectRef>
+      <a:fontRef idx="minor"/>
+    </dgm:style>
+  </dgm:styleLbl>
+  <dgm:styleLbl name="solidBgAcc1">
+    <dgm:scene3d>
+      <a:camera prst="orthographicFront"/>
+      <a:lightRig rig="threePt" dir="t"/>
+    </dgm:scene3d>
+    <dgm:sp3d/>
+    <dgm:txPr/>
+    <dgm:style>
+      <a:lnRef idx="2">
+        <a:scrgbClr r="0" g="0" b="0"/>
+      </a:lnRef>
+      <a:fillRef idx="1">
+        <a:scrgbClr r="0" g="0" b="0"/>
+      </a:fillRef>
+      <a:effectRef idx="0">
+        <a:scrgbClr r="0" g="0" b="0"/>
+      </a:effectRef>
+      <a:fontRef idx="minor"/>
+    </dgm:style>
+  </dgm:styleLbl>
+  <dgm:styleLbl name="fgAccFollowNode1">
+    <dgm:scene3d>
+      <a:camera prst="orthographicFront"/>
+      <a:lightRig rig="threePt" dir="t"/>
+    </dgm:scene3d>
+    <dgm:sp3d/>
+    <dgm:txPr/>
+    <dgm:style>
+      <a:lnRef idx="2">
+        <a:scrgbClr r="0" g="0" b="0"/>
+      </a:lnRef>
+      <a:fillRef idx="1">
+        <a:scrgbClr r="0" g="0" b="0"/>
+      </a:fillRef>
+      <a:effectRef idx="0">
+        <a:scrgbClr r="0" g="0" b="0"/>
+      </a:effectRef>
+      <a:fontRef idx="minor"/>
+    </dgm:style>
+  </dgm:styleLbl>
+  <dgm:styleLbl name="alignAccFollowNode1">
+    <dgm:scene3d>
+      <a:camera prst="orthographicFront"/>
+      <a:lightRig rig="threePt" dir="t"/>
+    </dgm:scene3d>
+    <dgm:sp3d/>
+    <dgm:txPr/>
+    <dgm:style>
+      <a:lnRef idx="2">
+        <a:scrgbClr r="0" g="0" b="0"/>
+      </a:lnRef>
+      <a:fillRef idx="1">
+        <a:scrgbClr r="0" g="0" b="0"/>
+      </a:fillRef>
+      <a:effectRef idx="0">
+        <a:scrgbClr r="0" g="0" b="0"/>
+      </a:effectRef>
+      <a:fontRef idx="minor"/>
+    </dgm:style>
+  </dgm:styleLbl>
+  <dgm:styleLbl name="bgAccFollowNode1">
+    <dgm:scene3d>
+      <a:camera prst="orthographicFront"/>
+      <a:lightRig rig="threePt" dir="t"/>
+    </dgm:scene3d>
+    <dgm:sp3d/>
+    <dgm:txPr/>
+    <dgm:style>
+      <a:lnRef idx="2">
+        <a:scrgbClr r="0" g="0" b="0"/>
+      </a:lnRef>
+      <a:fillRef idx="1">
+        <a:scrgbClr r="0" g="0" b="0"/>
+      </a:fillRef>
+      <a:effectRef idx="0">
+        <a:scrgbClr r="0" g="0" b="0"/>
+      </a:effectRef>
+      <a:fontRef idx="minor"/>
+    </dgm:style>
+  </dgm:styleLbl>
+  <dgm:styleLbl name="fgAcc0">
+    <dgm:scene3d>
+      <a:camera prst="orthographicFront"/>
+      <a:lightRig rig="threePt" dir="t"/>
+    </dgm:scene3d>
+    <dgm:sp3d/>
+    <dgm:txPr/>
+    <dgm:style>
+      <a:lnRef idx="2">
+        <a:scrgbClr r="0" g="0" b="0"/>
+      </a:lnRef>
+      <a:fillRef idx="1">
+        <a:scrgbClr r="0" g="0" b="0"/>
+      </a:fillRef>
+      <a:effectRef idx="0">
+        <a:scrgbClr r="0" g="0" b="0"/>
+      </a:effectRef>
+      <a:fontRef idx="minor"/>
+    </dgm:style>
+  </dgm:styleLbl>
+  <dgm:styleLbl name="fgAcc2">
+    <dgm:scene3d>
+      <a:camera prst="orthographicFront"/>
+      <a:lightRig rig="threePt" dir="t"/>
+    </dgm:scene3d>
+    <dgm:sp3d/>
+    <dgm:txPr/>
+    <dgm:style>
+      <a:lnRef idx="2">
+        <a:scrgbClr r="0" g="0" b="0"/>
+      </a:lnRef>
+      <a:fillRef idx="1">
+        <a:scrgbClr r="0" g="0" b="0"/>
+      </a:fillRef>
+      <a:effectRef idx="0">
+        <a:scrgbClr r="0" g="0" b="0"/>
+      </a:effectRef>
+      <a:fontRef idx="minor"/>
+    </dgm:style>
+  </dgm:styleLbl>
+  <dgm:styleLbl name="fgAcc3">
+    <dgm:scene3d>
+      <a:camera prst="orthographicFront"/>
+      <a:lightRig rig="threePt" dir="t"/>
+    </dgm:scene3d>
+    <dgm:sp3d/>
+    <dgm:txPr/>
+    <dgm:style>
+      <a:lnRef idx="2">
+        <a:scrgbClr r="0" g="0" b="0"/>
+      </a:lnRef>
+      <a:fillRef idx="1">
+        <a:scrgbClr r="0" g="0" b="0"/>
+      </a:fillRef>
+      <a:effectRef idx="0">
+        <a:scrgbClr r="0" g="0" b="0"/>
+      </a:effectRef>
+      <a:fontRef idx="minor"/>
+    </dgm:style>
+  </dgm:styleLbl>
+  <dgm:styleLbl name="fgAcc4">
+    <dgm:scene3d>
+      <a:camera prst="orthographicFront"/>
+      <a:lightRig rig="threePt" dir="t"/>
+    </dgm:scene3d>
+    <dgm:sp3d/>
+    <dgm:txPr/>
+    <dgm:style>
+      <a:lnRef idx="2">
+        <a:scrgbClr r="0" g="0" b="0"/>
+      </a:lnRef>
+      <a:fillRef idx="1">
+        <a:scrgbClr r="0" g="0" b="0"/>
+      </a:fillRef>
+      <a:effectRef idx="0">
+        <a:scrgbClr r="0" g="0" b="0"/>
+      </a:effectRef>
+      <a:fontRef idx="minor"/>
+    </dgm:style>
+  </dgm:styleLbl>
+  <dgm:styleLbl name="bgShp">
+    <dgm:scene3d>
+      <a:camera prst="orthographicFront"/>
+      <a:lightRig rig="threePt" dir="t"/>
+    </dgm:scene3d>
+    <dgm:sp3d/>
+    <dgm:txPr/>
+    <dgm:style>
+      <a:lnRef idx="0">
+        <a:scrgbClr r="0" g="0" b="0"/>
+      </a:lnRef>
+      <a:fillRef idx="1">
+        <a:scrgbClr r="0" g="0" b="0"/>
+      </a:fillRef>
+      <a:effectRef idx="0">
+        <a:scrgbClr r="0" g="0" b="0"/>
+      </a:effectRef>
+      <a:fontRef idx="minor"/>
+    </dgm:style>
+  </dgm:styleLbl>
+  <dgm:styleLbl name="dkBgShp">
+    <dgm:scene3d>
+      <a:camera prst="orthographicFront"/>
+      <a:lightRig rig="threePt" dir="t"/>
+    </dgm:scene3d>
+    <dgm:sp3d/>
+    <dgm:txPr/>
+    <dgm:style>
+      <a:lnRef idx="0">
+        <a:scrgbClr r="0" g="0" b="0"/>
+      </a:lnRef>
+      <a:fillRef idx="1">
+        <a:scrgbClr r="0" g="0" b="0"/>
+      </a:fillRef>
+      <a:effectRef idx="0">
+        <a:scrgbClr r="0" g="0" b="0"/>
+      </a:effectRef>
+      <a:fontRef idx="minor"/>
+    </dgm:style>
+  </dgm:styleLbl>
+  <dgm:styleLbl name="trBgShp">
+    <dgm:scene3d>
+      <a:camera prst="orthographicFront"/>
+      <a:lightRig rig="threePt" dir="t"/>
+    </dgm:scene3d>
+    <dgm:sp3d/>
+    <dgm:txPr/>
+    <dgm:style>
+      <a:lnRef idx="0">
+        <a:scrgbClr r="0" g="0" b="0"/>
+      </a:lnRef>
+      <a:fillRef idx="1">
+        <a:scrgbClr r="0" g="0" b="0"/>
+      </a:fillRef>
+      <a:effectRef idx="0">
+        <a:scrgbClr r="0" g="0" b="0"/>
+      </a:effectRef>
+      <a:fontRef idx="minor"/>
+    </dgm:style>
+  </dgm:styleLbl>
+  <dgm:styleLbl name="fgShp">
+    <dgm:scene3d>
+      <a:camera prst="orthographicFront"/>
+      <a:lightRig rig="threePt" dir="t"/>
+    </dgm:scene3d>
+    <dgm:sp3d/>
+    <dgm:txPr/>
+    <dgm:style>
+      <a:lnRef idx="2">
+        <a:scrgbClr r="0" g="0" b="0"/>
+      </a:lnRef>
+      <a:fillRef idx="1">
+        <a:scrgbClr r="0" g="0" b="0"/>
+      </a:fillRef>
+      <a:effectRef idx="0">
+        <a:scrgbClr r="0" g="0" b="0"/>
+      </a:effectRef>
+      <a:fontRef idx="minor"/>
+    </dgm:style>
+  </dgm:styleLbl>
+  <dgm:styleLbl name="revTx">
+    <dgm:scene3d>
+      <a:camera prst="orthographicFront"/>
+      <a:lightRig rig="threePt" dir="t"/>
+    </dgm:scene3d>
+    <dgm:sp3d/>
+    <dgm:txPr/>
+    <dgm:style>
+      <a:lnRef idx="0">
+        <a:scrgbClr r="0" g="0" b="0"/>
+      </a:lnRef>
+      <a:fillRef idx="0">
+        <a:scrgbClr r="0" g="0" b="0"/>
+      </a:fillRef>
+      <a:effectRef idx="0">
+        <a:scrgbClr r="0" g="0" b="0"/>
+      </a:effectRef>
+      <a:fontRef idx="minor"/>
+    </dgm:style>
+  </dgm:styleLbl>
+</dgm:styleDef>
 </file>
 
 <file path=ppt/notesMasters/notesMaster1.xml><?xml version="1.0" encoding="utf-8"?>
@@ -4576,7 +7545,7 @@
                 <a:latin typeface="Times New Roman" panose="02020603050405020304" pitchFamily="18" charset="0"/>
                 <a:cs typeface="Times New Roman" panose="02020603050405020304" pitchFamily="18" charset="0"/>
               </a:rPr>
-              <a:t>blockchain</a:t>
+              <a:t>Blockchain</a:t>
             </a:r>
             <a:r>
               <a:rPr lang="en-US" dirty="0">
@@ -4663,14 +7632,6 @@
             </a:lvl1pPr>
           </a:lstStyle>
           <a:p>
-            <a:r>
-              <a:rPr lang="en-US" b="1" dirty="0">
-                <a:effectLst/>
-                <a:latin typeface="Times New Roman" panose="02020603050405020304" pitchFamily="18" charset="0"/>
-                <a:cs typeface="Times New Roman" panose="02020603050405020304" pitchFamily="18" charset="0"/>
-              </a:rPr>
-              <a:t>Why should I care?</a:t>
-            </a:r>
             <a:endParaRPr lang="en-US" dirty="0">
               <a:latin typeface="Times New Roman" panose="02020603050405020304" pitchFamily="18" charset="0"/>
               <a:cs typeface="Times New Roman" panose="02020603050405020304" pitchFamily="18" charset="0"/>
@@ -4750,10 +7711,316 @@
           </a:prstGeom>
         </p:spPr>
       </p:pic>
+      <p:sp>
+        <p:nvSpPr>
+          <p:cNvPr id="10" name="Title 1">
+            <a:extLst>
+              <a:ext uri="{FF2B5EF4-FFF2-40B4-BE49-F238E27FC236}">
+                <a16:creationId xmlns:a16="http://schemas.microsoft.com/office/drawing/2014/main" id="{F3A9AAFE-7FFC-4BF0-B83D-038824B09DEC}"/>
+              </a:ext>
+            </a:extLst>
+          </p:cNvPr>
+          <p:cNvSpPr>
+            <a:spLocks noGrp="1"/>
+          </p:cNvSpPr>
+          <p:nvPr>
+            <p:ph type="title"/>
+          </p:nvPr>
+        </p:nvSpPr>
+        <p:spPr>
+          <a:xfrm>
+            <a:off x="2434130" y="128470"/>
+            <a:ext cx="6260905" cy="725349"/>
+          </a:xfrm>
+        </p:spPr>
+        <p:txBody>
+          <a:bodyPr/>
+          <a:lstStyle/>
+          <a:p>
+            <a:r>
+              <a:rPr lang="en-US" dirty="0">
+                <a:effectLst>
+                  <a:outerShdw blurRad="38100" dist="38100" dir="2700000" algn="tl">
+                    <a:srgbClr val="000000">
+                      <a:alpha val="43137"/>
+                    </a:srgbClr>
+                  </a:outerShdw>
+                </a:effectLst>
+                <a:latin typeface="Times New Roman" panose="02020603050405020304" pitchFamily="18" charset="0"/>
+                <a:cs typeface="Times New Roman" panose="02020603050405020304" pitchFamily="18" charset="0"/>
+              </a:rPr>
+              <a:t>Why should I care?</a:t>
+            </a:r>
+          </a:p>
+        </p:txBody>
+      </p:sp>
     </p:spTree>
     <p:extLst>
       <p:ext uri="{BB962C8B-B14F-4D97-AF65-F5344CB8AC3E}">
         <p14:creationId xmlns:p14="http://schemas.microsoft.com/office/powerpoint/2010/main" val="2135896429"/>
+      </p:ext>
+    </p:extLst>
+  </p:cSld>
+  <p:clrMapOvr>
+    <a:masterClrMapping/>
+  </p:clrMapOvr>
+</p:sld>
+</file>
+
+<file path=ppt/slides/slide4.xml><?xml version="1.0" encoding="utf-8"?>
+<p:sld xmlns:a="http://schemas.openxmlformats.org/drawingml/2006/main" xmlns:r="http://schemas.openxmlformats.org/officeDocument/2006/relationships" xmlns:p="http://schemas.openxmlformats.org/presentationml/2006/main">
+  <p:cSld>
+    <p:spTree>
+      <p:nvGrpSpPr>
+        <p:cNvPr id="1" name=""/>
+        <p:cNvGrpSpPr/>
+        <p:nvPr/>
+      </p:nvGrpSpPr>
+      <p:grpSpPr>
+        <a:xfrm>
+          <a:off x="0" y="0"/>
+          <a:ext cx="0" cy="0"/>
+          <a:chOff x="0" y="0"/>
+          <a:chExt cx="0" cy="0"/>
+        </a:xfrm>
+      </p:grpSpPr>
+      <p:sp>
+        <p:nvSpPr>
+          <p:cNvPr id="5" name="Title 1">
+            <a:extLst>
+              <a:ext uri="{FF2B5EF4-FFF2-40B4-BE49-F238E27FC236}">
+                <a16:creationId xmlns:a16="http://schemas.microsoft.com/office/drawing/2014/main" id="{4F61D753-B49B-4B37-A990-D61E98AEF339}"/>
+              </a:ext>
+            </a:extLst>
+          </p:cNvPr>
+          <p:cNvSpPr>
+            <a:spLocks noGrp="1"/>
+          </p:cNvSpPr>
+          <p:nvPr>
+            <p:ph type="title"/>
+          </p:nvPr>
+        </p:nvSpPr>
+        <p:spPr>
+          <a:xfrm>
+            <a:off x="2434130" y="128470"/>
+            <a:ext cx="6260905" cy="725349"/>
+          </a:xfrm>
+        </p:spPr>
+        <p:txBody>
+          <a:bodyPr/>
+          <a:lstStyle/>
+          <a:p>
+            <a:r>
+              <a:rPr lang="en-US" dirty="0">
+                <a:effectLst>
+                  <a:outerShdw blurRad="38100" dist="38100" dir="2700000" algn="tl">
+                    <a:srgbClr val="000000">
+                      <a:alpha val="43137"/>
+                    </a:srgbClr>
+                  </a:outerShdw>
+                </a:effectLst>
+                <a:latin typeface="Times New Roman" panose="02020603050405020304" pitchFamily="18" charset="0"/>
+                <a:cs typeface="Times New Roman" panose="02020603050405020304" pitchFamily="18" charset="0"/>
+              </a:rPr>
+              <a:t>What is Blockchain</a:t>
+            </a:r>
+            <a:r>
+              <a:rPr lang="en-US" b="1" dirty="0">
+                <a:effectLst>
+                  <a:outerShdw blurRad="38100" dist="38100" dir="2700000" algn="tl">
+                    <a:srgbClr val="000000">
+                      <a:alpha val="43137"/>
+                    </a:srgbClr>
+                  </a:outerShdw>
+                </a:effectLst>
+                <a:latin typeface="Times New Roman" panose="02020603050405020304" pitchFamily="18" charset="0"/>
+                <a:cs typeface="Times New Roman" panose="02020603050405020304" pitchFamily="18" charset="0"/>
+              </a:rPr>
+              <a:t>?</a:t>
+            </a:r>
+            <a:endParaRPr lang="en-US" dirty="0">
+              <a:effectLst>
+                <a:outerShdw blurRad="38100" dist="38100" dir="2700000" algn="tl">
+                  <a:srgbClr val="000000">
+                    <a:alpha val="43137"/>
+                  </a:srgbClr>
+                </a:outerShdw>
+              </a:effectLst>
+              <a:latin typeface="Times New Roman" panose="02020603050405020304" pitchFamily="18" charset="0"/>
+              <a:cs typeface="Times New Roman" panose="02020603050405020304" pitchFamily="18" charset="0"/>
+            </a:endParaRPr>
+          </a:p>
+        </p:txBody>
+      </p:sp>
+      <p:sp>
+        <p:nvSpPr>
+          <p:cNvPr id="6" name="TextBox 5">
+            <a:extLst>
+              <a:ext uri="{FF2B5EF4-FFF2-40B4-BE49-F238E27FC236}">
+                <a16:creationId xmlns:a16="http://schemas.microsoft.com/office/drawing/2014/main" id="{1A0C3367-42F3-49FB-8FE5-A510E3F7AF01}"/>
+              </a:ext>
+            </a:extLst>
+          </p:cNvPr>
+          <p:cNvSpPr txBox="1"/>
+          <p:nvPr/>
+        </p:nvSpPr>
+        <p:spPr>
+          <a:xfrm>
+            <a:off x="2434130" y="1556087"/>
+            <a:ext cx="6108200" cy="2031325"/>
+          </a:xfrm>
+          <a:prstGeom prst="rect">
+            <a:avLst/>
+          </a:prstGeom>
+          <a:noFill/>
+        </p:spPr>
+        <p:txBody>
+          <a:bodyPr wrap="square" rtlCol="0">
+            <a:spAutoFit/>
+          </a:bodyPr>
+          <a:lstStyle/>
+          <a:p>
+            <a:pPr algn="just"/>
+            <a:r>
+              <a:rPr lang="en-US" dirty="0">
+                <a:latin typeface="Times New Roman" panose="02020603050405020304" pitchFamily="18" charset="0"/>
+                <a:cs typeface="Times New Roman" panose="02020603050405020304" pitchFamily="18" charset="0"/>
+              </a:rPr>
+              <a:t>Blockchain is a shared, distributed ledger that facilitates the process of recording transactions and tracking assets in a business network. An asset can be tangible — a house, a car, cash, land  — or intangible like intellectual property, such as patents, copyrights, or branding. Virtually anything of value can be tracked and traded on a blockchain network, reducing risk and cutting costs for all involved</a:t>
+            </a:r>
+          </a:p>
+        </p:txBody>
+      </p:sp>
+    </p:spTree>
+    <p:extLst>
+      <p:ext uri="{BB962C8B-B14F-4D97-AF65-F5344CB8AC3E}">
+        <p14:creationId xmlns:p14="http://schemas.microsoft.com/office/powerpoint/2010/main" val="3497715825"/>
+      </p:ext>
+    </p:extLst>
+  </p:cSld>
+  <p:clrMapOvr>
+    <a:masterClrMapping/>
+  </p:clrMapOvr>
+</p:sld>
+</file>
+
+<file path=ppt/slides/slide5.xml><?xml version="1.0" encoding="utf-8"?>
+<p:sld xmlns:a="http://schemas.openxmlformats.org/drawingml/2006/main" xmlns:r="http://schemas.openxmlformats.org/officeDocument/2006/relationships" xmlns:p="http://schemas.openxmlformats.org/presentationml/2006/main">
+  <p:cSld>
+    <p:spTree>
+      <p:nvGrpSpPr>
+        <p:cNvPr id="1" name=""/>
+        <p:cNvGrpSpPr/>
+        <p:nvPr/>
+      </p:nvGrpSpPr>
+      <p:grpSpPr>
+        <a:xfrm>
+          <a:off x="0" y="0"/>
+          <a:ext cx="0" cy="0"/>
+          <a:chOff x="0" y="0"/>
+          <a:chExt cx="0" cy="0"/>
+        </a:xfrm>
+      </p:grpSpPr>
+      <p:sp>
+        <p:nvSpPr>
+          <p:cNvPr id="5" name="Title 1">
+            <a:extLst>
+              <a:ext uri="{FF2B5EF4-FFF2-40B4-BE49-F238E27FC236}">
+                <a16:creationId xmlns:a16="http://schemas.microsoft.com/office/drawing/2014/main" id="{4F61D753-B49B-4B37-A990-D61E98AEF339}"/>
+              </a:ext>
+            </a:extLst>
+          </p:cNvPr>
+          <p:cNvSpPr>
+            <a:spLocks noGrp="1"/>
+          </p:cNvSpPr>
+          <p:nvPr>
+            <p:ph type="title"/>
+          </p:nvPr>
+        </p:nvSpPr>
+        <p:spPr>
+          <a:xfrm>
+            <a:off x="2434130" y="128470"/>
+            <a:ext cx="6260905" cy="725349"/>
+          </a:xfrm>
+        </p:spPr>
+        <p:txBody>
+          <a:bodyPr/>
+          <a:lstStyle/>
+          <a:p>
+            <a:r>
+              <a:rPr lang="en-US" dirty="0">
+                <a:effectLst>
+                  <a:outerShdw blurRad="38100" dist="38100" dir="2700000" algn="tl">
+                    <a:srgbClr val="000000">
+                      <a:alpha val="43137"/>
+                    </a:srgbClr>
+                  </a:outerShdw>
+                </a:effectLst>
+                <a:latin typeface="Times New Roman" panose="02020603050405020304" pitchFamily="18" charset="0"/>
+                <a:cs typeface="Times New Roman" panose="02020603050405020304" pitchFamily="18" charset="0"/>
+              </a:rPr>
+              <a:t>What is Blockchain</a:t>
+            </a:r>
+            <a:r>
+              <a:rPr lang="en-US" b="1" dirty="0">
+                <a:effectLst>
+                  <a:outerShdw blurRad="38100" dist="38100" dir="2700000" algn="tl">
+                    <a:srgbClr val="000000">
+                      <a:alpha val="43137"/>
+                    </a:srgbClr>
+                  </a:outerShdw>
+                </a:effectLst>
+                <a:latin typeface="Times New Roman" panose="02020603050405020304" pitchFamily="18" charset="0"/>
+                <a:cs typeface="Times New Roman" panose="02020603050405020304" pitchFamily="18" charset="0"/>
+              </a:rPr>
+              <a:t>?</a:t>
+            </a:r>
+            <a:endParaRPr lang="en-US" dirty="0">
+              <a:effectLst>
+                <a:outerShdw blurRad="38100" dist="38100" dir="2700000" algn="tl">
+                  <a:srgbClr val="000000">
+                    <a:alpha val="43137"/>
+                  </a:srgbClr>
+                </a:outerShdw>
+              </a:effectLst>
+              <a:latin typeface="Times New Roman" panose="02020603050405020304" pitchFamily="18" charset="0"/>
+              <a:cs typeface="Times New Roman" panose="02020603050405020304" pitchFamily="18" charset="0"/>
+            </a:endParaRPr>
+          </a:p>
+        </p:txBody>
+      </p:sp>
+      <p:graphicFrame>
+        <p:nvGraphicFramePr>
+          <p:cNvPr id="3" name="Diagram 2">
+            <a:extLst>
+              <a:ext uri="{FF2B5EF4-FFF2-40B4-BE49-F238E27FC236}">
+                <a16:creationId xmlns:a16="http://schemas.microsoft.com/office/drawing/2014/main" id="{2A1C80B0-3973-453C-BEE3-DA479CB8B417}"/>
+              </a:ext>
+            </a:extLst>
+          </p:cNvPr>
+          <p:cNvGraphicFramePr/>
+          <p:nvPr>
+            <p:extLst>
+              <p:ext uri="{D42A27DB-BD31-4B8C-83A1-F6EECF244321}">
+                <p14:modId xmlns:p14="http://schemas.microsoft.com/office/powerpoint/2010/main" val="3944405033"/>
+              </p:ext>
+            </p:extLst>
+          </p:nvPr>
+        </p:nvGraphicFramePr>
+        <p:xfrm>
+          <a:off x="2434130" y="1173987"/>
+          <a:ext cx="5033165" cy="2795525"/>
+        </p:xfrm>
+        <a:graphic>
+          <a:graphicData uri="http://schemas.openxmlformats.org/drawingml/2006/diagram">
+            <dgm:relIds xmlns:dgm="http://schemas.openxmlformats.org/drawingml/2006/diagram" xmlns:r="http://schemas.openxmlformats.org/officeDocument/2006/relationships" r:dm="rId2" r:lo="rId3" r:qs="rId4" r:cs="rId5"/>
+          </a:graphicData>
+        </a:graphic>
+      </p:graphicFrame>
+    </p:spTree>
+    <p:extLst>
+      <p:ext uri="{BB962C8B-B14F-4D97-AF65-F5344CB8AC3E}">
+        <p14:creationId xmlns:p14="http://schemas.microsoft.com/office/powerpoint/2010/main" val="3116873395"/>
       </p:ext>
     </p:extLst>
   </p:cSld>

</xml_diff>

<commit_message>
cen vs decen 2
</commit_message>
<xml_diff>
--- a/Blockchain 101.pptx
+++ b/Blockchain 101.pptx
@@ -8340,33 +8340,52 @@
             <p:ph type="title"/>
           </p:nvPr>
         </p:nvSpPr>
-        <p:spPr/>
+        <p:spPr>
+          <a:xfrm>
+            <a:off x="525316" y="281175"/>
+            <a:ext cx="8322423" cy="763525"/>
+          </a:xfrm>
+        </p:spPr>
         <p:txBody>
           <a:bodyPr>
-            <a:normAutofit fontScale="90000"/>
+            <a:noAutofit/>
           </a:bodyPr>
           <a:lstStyle/>
           <a:p>
             <a:br>
-              <a:rPr lang="en-US" dirty="0">
+              <a:rPr lang="en-US" sz="3000" dirty="0">
                 <a:latin typeface="Times New Roman" panose="02020603050405020304" pitchFamily="18" charset="0"/>
                 <a:cs typeface="Times New Roman" panose="02020603050405020304" pitchFamily="18" charset="0"/>
               </a:rPr>
             </a:br>
             <a:r>
-              <a:rPr lang="en-US" dirty="0">
+              <a:rPr lang="en-US" sz="3000" dirty="0">
                 <a:latin typeface="Times New Roman" panose="02020603050405020304" pitchFamily="18" charset="0"/>
                 <a:cs typeface="Times New Roman" panose="02020603050405020304" pitchFamily="18" charset="0"/>
               </a:rPr>
-              <a:t>Centralized vs decentralized</a:t>
+              <a:t>   Centralized vs </a:t>
+            </a:r>
+            <a:r>
+              <a:rPr lang="en-US" sz="3200" dirty="0">
+                <a:latin typeface="Times New Roman" panose="02020603050405020304" pitchFamily="18" charset="0"/>
+                <a:cs typeface="Times New Roman" panose="02020603050405020304" pitchFamily="18" charset="0"/>
+              </a:rPr>
+              <a:t>distributed</a:t>
+            </a:r>
+            <a:r>
+              <a:rPr lang="en-US" sz="3000" dirty="0">
+                <a:latin typeface="Times New Roman" panose="02020603050405020304" pitchFamily="18" charset="0"/>
+                <a:cs typeface="Times New Roman" panose="02020603050405020304" pitchFamily="18" charset="0"/>
+              </a:rPr>
+              <a:t> ledger</a:t>
             </a:r>
             <a:br>
-              <a:rPr lang="en-US" dirty="0">
+              <a:rPr lang="en-US" sz="3000" dirty="0">
                 <a:latin typeface="Times New Roman" panose="02020603050405020304" pitchFamily="18" charset="0"/>
                 <a:cs typeface="Times New Roman" panose="02020603050405020304" pitchFamily="18" charset="0"/>
               </a:rPr>
             </a:br>
-            <a:endParaRPr lang="en-US" dirty="0">
+            <a:endParaRPr lang="en-US" sz="3000" dirty="0">
               <a:latin typeface="Times New Roman" panose="02020603050405020304" pitchFamily="18" charset="0"/>
               <a:cs typeface="Times New Roman" panose="02020603050405020304" pitchFamily="18" charset="0"/>
             </a:endParaRPr>
@@ -8443,6 +8462,84 @@
           </a:xfrm>
         </p:spPr>
       </p:pic>
+      <p:sp>
+        <p:nvSpPr>
+          <p:cNvPr id="15" name="TextBox 14">
+            <a:extLst>
+              <a:ext uri="{FF2B5EF4-FFF2-40B4-BE49-F238E27FC236}">
+                <a16:creationId xmlns:a16="http://schemas.microsoft.com/office/drawing/2014/main" id="{A01F8EC6-7324-4D16-B8CC-2ED442EB6DE7}"/>
+              </a:ext>
+            </a:extLst>
+          </p:cNvPr>
+          <p:cNvSpPr txBox="1"/>
+          <p:nvPr/>
+        </p:nvSpPr>
+        <p:spPr>
+          <a:xfrm>
+            <a:off x="1797541" y="4245693"/>
+            <a:ext cx="1507144" cy="307777"/>
+          </a:xfrm>
+          <a:prstGeom prst="rect">
+            <a:avLst/>
+          </a:prstGeom>
+          <a:noFill/>
+        </p:spPr>
+        <p:txBody>
+          <a:bodyPr wrap="none" rtlCol="0">
+            <a:spAutoFit/>
+          </a:bodyPr>
+          <a:lstStyle/>
+          <a:p>
+            <a:r>
+              <a:rPr lang="en-US" sz="1400" dirty="0">
+                <a:latin typeface="Times New Roman" panose="02020603050405020304" pitchFamily="18" charset="0"/>
+                <a:cs typeface="Times New Roman" panose="02020603050405020304" pitchFamily="18" charset="0"/>
+              </a:rPr>
+              <a:t>Centralized ledger</a:t>
+            </a:r>
+            <a:endParaRPr lang="en-US" sz="1400" dirty="0"/>
+          </a:p>
+        </p:txBody>
+      </p:sp>
+      <p:sp>
+        <p:nvSpPr>
+          <p:cNvPr id="16" name="TextBox 15">
+            <a:extLst>
+              <a:ext uri="{FF2B5EF4-FFF2-40B4-BE49-F238E27FC236}">
+                <a16:creationId xmlns:a16="http://schemas.microsoft.com/office/drawing/2014/main" id="{78FA4ADB-9B81-4209-9A9E-EB5A38AB0190}"/>
+              </a:ext>
+            </a:extLst>
+          </p:cNvPr>
+          <p:cNvSpPr txBox="1"/>
+          <p:nvPr/>
+        </p:nvSpPr>
+        <p:spPr>
+          <a:xfrm>
+            <a:off x="5839315" y="4245693"/>
+            <a:ext cx="1486304" cy="307777"/>
+          </a:xfrm>
+          <a:prstGeom prst="rect">
+            <a:avLst/>
+          </a:prstGeom>
+          <a:noFill/>
+        </p:spPr>
+        <p:txBody>
+          <a:bodyPr wrap="none" rtlCol="0">
+            <a:spAutoFit/>
+          </a:bodyPr>
+          <a:lstStyle/>
+          <a:p>
+            <a:r>
+              <a:rPr lang="en-US" sz="1400" dirty="0">
+                <a:latin typeface="Times New Roman" panose="02020603050405020304" pitchFamily="18" charset="0"/>
+                <a:cs typeface="Times New Roman" panose="02020603050405020304" pitchFamily="18" charset="0"/>
+              </a:rPr>
+              <a:t>Distributed ledger</a:t>
+            </a:r>
+            <a:endParaRPr lang="en-US" sz="1400" dirty="0"/>
+          </a:p>
+        </p:txBody>
+      </p:sp>
     </p:spTree>
     <p:extLst>
       <p:ext uri="{BB962C8B-B14F-4D97-AF65-F5344CB8AC3E}">

</xml_diff>

<commit_message>
cen vs decn 3
</commit_message>
<xml_diff>
--- a/Blockchain 101.pptx
+++ b/Blockchain 101.pptx
@@ -5,7 +5,7 @@
     <p:sldMasterId id="2147483648" r:id="rId1"/>
   </p:sldMasterIdLst>
   <p:notesMasterIdLst>
-    <p:notesMasterId r:id="rId10"/>
+    <p:notesMasterId r:id="rId11"/>
   </p:notesMasterIdLst>
   <p:sldIdLst>
     <p:sldId id="256" r:id="rId2"/>
@@ -16,6 +16,7 @@
     <p:sldId id="263" r:id="rId7"/>
     <p:sldId id="264" r:id="rId8"/>
     <p:sldId id="262" r:id="rId9"/>
+    <p:sldId id="265" r:id="rId10"/>
   </p:sldIdLst>
   <p:sldSz cx="9144000" cy="5143500" type="screen16x9"/>
   <p:notesSz cx="6858000" cy="9144000"/>
@@ -7341,7 +7342,7 @@
                 <a:latin typeface="Times New Roman" panose="02020603050405020304" pitchFamily="18" charset="0"/>
                 <a:cs typeface="Times New Roman" panose="02020603050405020304" pitchFamily="18" charset="0"/>
               </a:rPr>
-              <a:t>Centralized vs decentralized</a:t>
+              <a:t>Centralized vs distributed </a:t>
             </a:r>
           </a:p>
           <a:p>
@@ -7434,7 +7435,7 @@
                 <a:latin typeface="Times New Roman" panose="02020603050405020304" pitchFamily="18" charset="0"/>
                 <a:cs typeface="Times New Roman" panose="02020603050405020304" pitchFamily="18" charset="0"/>
               </a:rPr>
-              <a:t>Some interesting charts</a:t>
+              <a:t>Some interesting facts</a:t>
             </a:r>
             <a:endParaRPr lang="fa-IR" dirty="0">
               <a:latin typeface="Times New Roman" panose="02020603050405020304" pitchFamily="18" charset="0"/>
@@ -8250,7 +8251,7 @@
                 <a:latin typeface="Times New Roman" panose="02020603050405020304" pitchFamily="18" charset="0"/>
                 <a:cs typeface="Times New Roman" panose="02020603050405020304" pitchFamily="18" charset="0"/>
               </a:rPr>
-              <a:t>Centralized vs decentralized</a:t>
+              <a:t>Centralized vs distributed</a:t>
             </a:r>
             <a:br>
               <a:rPr lang="en-US" dirty="0">
@@ -8300,6 +8301,84 @@
           </a:prstGeom>
         </p:spPr>
       </p:pic>
+      <p:sp>
+        <p:nvSpPr>
+          <p:cNvPr id="11" name="TextBox 10">
+            <a:extLst>
+              <a:ext uri="{FF2B5EF4-FFF2-40B4-BE49-F238E27FC236}">
+                <a16:creationId xmlns:a16="http://schemas.microsoft.com/office/drawing/2014/main" id="{9AB05CAE-A0CD-4371-B577-D72141B00272}"/>
+              </a:ext>
+            </a:extLst>
+          </p:cNvPr>
+          <p:cNvSpPr txBox="1"/>
+          <p:nvPr/>
+        </p:nvSpPr>
+        <p:spPr>
+          <a:xfrm>
+            <a:off x="2281425" y="4251505"/>
+            <a:ext cx="1013419" cy="307777"/>
+          </a:xfrm>
+          <a:prstGeom prst="rect">
+            <a:avLst/>
+          </a:prstGeom>
+          <a:noFill/>
+        </p:spPr>
+        <p:txBody>
+          <a:bodyPr wrap="none" rtlCol="0">
+            <a:spAutoFit/>
+          </a:bodyPr>
+          <a:lstStyle/>
+          <a:p>
+            <a:r>
+              <a:rPr lang="en-US" sz="1400" dirty="0">
+                <a:latin typeface="Times New Roman" panose="02020603050405020304" pitchFamily="18" charset="0"/>
+                <a:cs typeface="Times New Roman" panose="02020603050405020304" pitchFamily="18" charset="0"/>
+              </a:rPr>
+              <a:t>Centralized</a:t>
+            </a:r>
+            <a:endParaRPr lang="en-US" sz="1400" dirty="0"/>
+          </a:p>
+        </p:txBody>
+      </p:sp>
+      <p:sp>
+        <p:nvSpPr>
+          <p:cNvPr id="13" name="TextBox 12">
+            <a:extLst>
+              <a:ext uri="{FF2B5EF4-FFF2-40B4-BE49-F238E27FC236}">
+                <a16:creationId xmlns:a16="http://schemas.microsoft.com/office/drawing/2014/main" id="{3726B6E8-BB79-4D4A-A79B-05B31C343047}"/>
+              </a:ext>
+            </a:extLst>
+          </p:cNvPr>
+          <p:cNvSpPr txBox="1"/>
+          <p:nvPr/>
+        </p:nvSpPr>
+        <p:spPr>
+          <a:xfrm>
+            <a:off x="5182820" y="4251504"/>
+            <a:ext cx="992579" cy="307777"/>
+          </a:xfrm>
+          <a:prstGeom prst="rect">
+            <a:avLst/>
+          </a:prstGeom>
+          <a:noFill/>
+        </p:spPr>
+        <p:txBody>
+          <a:bodyPr wrap="none" rtlCol="0">
+            <a:spAutoFit/>
+          </a:bodyPr>
+          <a:lstStyle/>
+          <a:p>
+            <a:r>
+              <a:rPr lang="en-US" sz="1400" dirty="0">
+                <a:latin typeface="Times New Roman" panose="02020603050405020304" pitchFamily="18" charset="0"/>
+                <a:cs typeface="Times New Roman" panose="02020603050405020304" pitchFamily="18" charset="0"/>
+              </a:rPr>
+              <a:t>Distributed</a:t>
+            </a:r>
+            <a:endParaRPr lang="en-US" sz="1400" dirty="0"/>
+          </a:p>
+        </p:txBody>
+      </p:sp>
     </p:spTree>
     <p:extLst>
       <p:ext uri="{BB962C8B-B14F-4D97-AF65-F5344CB8AC3E}">
@@ -8544,6 +8623,72 @@
     <p:extLst>
       <p:ext uri="{BB962C8B-B14F-4D97-AF65-F5344CB8AC3E}">
         <p14:creationId xmlns:p14="http://schemas.microsoft.com/office/powerpoint/2010/main" val="1198196623"/>
+      </p:ext>
+    </p:extLst>
+  </p:cSld>
+  <p:clrMapOvr>
+    <a:masterClrMapping/>
+  </p:clrMapOvr>
+</p:sld>
+</file>
+
+<file path=ppt/slides/slide9.xml><?xml version="1.0" encoding="utf-8"?>
+<p:sld xmlns:a="http://schemas.openxmlformats.org/drawingml/2006/main" xmlns:r="http://schemas.openxmlformats.org/officeDocument/2006/relationships" xmlns:p="http://schemas.openxmlformats.org/presentationml/2006/main">
+  <p:cSld>
+    <p:spTree>
+      <p:nvGrpSpPr>
+        <p:cNvPr id="1" name=""/>
+        <p:cNvGrpSpPr/>
+        <p:nvPr/>
+      </p:nvGrpSpPr>
+      <p:grpSpPr>
+        <a:xfrm>
+          <a:off x="0" y="0"/>
+          <a:ext cx="0" cy="0"/>
+          <a:chOff x="0" y="0"/>
+          <a:chExt cx="0" cy="0"/>
+        </a:xfrm>
+      </p:grpSpPr>
+      <p:sp>
+        <p:nvSpPr>
+          <p:cNvPr id="5" name="Title 1">
+            <a:extLst>
+              <a:ext uri="{FF2B5EF4-FFF2-40B4-BE49-F238E27FC236}">
+                <a16:creationId xmlns:a16="http://schemas.microsoft.com/office/drawing/2014/main" id="{4F61D753-B49B-4B37-A990-D61E98AEF339}"/>
+              </a:ext>
+            </a:extLst>
+          </p:cNvPr>
+          <p:cNvSpPr>
+            <a:spLocks noGrp="1"/>
+          </p:cNvSpPr>
+          <p:nvPr>
+            <p:ph type="title"/>
+          </p:nvPr>
+        </p:nvSpPr>
+        <p:spPr>
+          <a:xfrm>
+            <a:off x="2434130" y="128470"/>
+            <a:ext cx="6260905" cy="725349"/>
+          </a:xfrm>
+        </p:spPr>
+        <p:txBody>
+          <a:bodyPr/>
+          <a:lstStyle/>
+          <a:p>
+            <a:r>
+              <a:rPr lang="en-US" dirty="0">
+                <a:latin typeface="Times New Roman" panose="02020603050405020304" pitchFamily="18" charset="0"/>
+                <a:cs typeface="Times New Roman" panose="02020603050405020304" pitchFamily="18" charset="0"/>
+              </a:rPr>
+              <a:t>Why Decentralization Matters?</a:t>
+            </a:r>
+          </a:p>
+        </p:txBody>
+      </p:sp>
+    </p:spTree>
+    <p:extLst>
+      <p:ext uri="{BB962C8B-B14F-4D97-AF65-F5344CB8AC3E}">
+        <p14:creationId xmlns:p14="http://schemas.microsoft.com/office/powerpoint/2010/main" val="231058729"/>
       </p:ext>
     </p:extLst>
   </p:cSld>

</xml_diff>